<commit_message>
Minor updates to MKE JS deck
</commit_message>
<xml_diff>
--- a/Intro to JavaScript Tooling in VS Code - MKEJS.pptx
+++ b/Intro to JavaScript Tooling in VS Code - MKEJS.pptx
@@ -238,7 +238,7 @@
           <a:p>
             <a:fld id="{669E24BE-8A14-406C-93AE-FEDF4702362B}" type="datetimeFigureOut">
               <a:rPr lang="en-US" smtClean="0"/>
-              <a:t>3/5/2016</a:t>
+              <a:t>3/14/2016</a:t>
             </a:fld>
             <a:endParaRPr lang="en-US" dirty="0"/>
           </a:p>
@@ -1311,7 +1311,7 @@
           <a:p>
             <a:fld id="{8008D7A7-D1E9-49FE-B288-75D755D02F1B}" type="datetime1">
               <a:rPr lang="en-US" smtClean="0"/>
-              <a:t>3/5/2016</a:t>
+              <a:t>3/14/2016</a:t>
             </a:fld>
             <a:endParaRPr lang="en-US" dirty="0"/>
           </a:p>
@@ -1574,7 +1574,7 @@
           <a:p>
             <a:fld id="{565130A9-CCEE-4E49-AF50-9A9178C093F5}" type="datetime1">
               <a:rPr lang="en-US" smtClean="0"/>
-              <a:t>3/5/2016</a:t>
+              <a:t>3/14/2016</a:t>
             </a:fld>
             <a:endParaRPr lang="en-US" dirty="0"/>
           </a:p>
@@ -1900,7 +1900,7 @@
           <a:p>
             <a:fld id="{5FFEE7F5-B2E5-489A-976D-734D7F853DE3}" type="datetime1">
               <a:rPr lang="en-US" smtClean="0"/>
-              <a:t>3/5/2016</a:t>
+              <a:t>3/14/2016</a:t>
             </a:fld>
             <a:endParaRPr lang="en-US" dirty="0"/>
           </a:p>
@@ -2253,7 +2253,7 @@
           <a:p>
             <a:fld id="{1DDC5727-5F18-4B62-81B5-C092F8CCA971}" type="datetime1">
               <a:rPr lang="en-US" smtClean="0"/>
-              <a:t>3/5/2016</a:t>
+              <a:t>3/14/2016</a:t>
             </a:fld>
             <a:endParaRPr lang="en-US" dirty="0"/>
           </a:p>
@@ -2579,7 +2579,7 @@
           <a:p>
             <a:fld id="{DD7596D5-BBCA-4EE5-AC34-2F838BA68892}" type="datetime1">
               <a:rPr lang="en-US" smtClean="0"/>
-              <a:t>3/5/2016</a:t>
+              <a:t>3/14/2016</a:t>
             </a:fld>
             <a:endParaRPr lang="en-US" dirty="0"/>
           </a:p>
@@ -2984,7 +2984,7 @@
           <a:p>
             <a:fld id="{C87E594A-105F-4330-BE78-40BFD5E05FF3}" type="datetime1">
               <a:rPr lang="en-US" smtClean="0"/>
-              <a:t>3/5/2016</a:t>
+              <a:t>3/14/2016</a:t>
             </a:fld>
             <a:endParaRPr lang="en-US" dirty="0"/>
           </a:p>
@@ -3166,7 +3166,7 @@
           <a:p>
             <a:fld id="{50DAB467-0635-440B-9BC4-DA322DD73B70}" type="datetime1">
               <a:rPr lang="en-US" smtClean="0"/>
-              <a:t>3/5/2016</a:t>
+              <a:t>3/14/2016</a:t>
             </a:fld>
             <a:endParaRPr lang="en-US" dirty="0"/>
           </a:p>
@@ -3358,7 +3358,7 @@
           <a:p>
             <a:fld id="{5E48D92D-E3A5-4B10-B1FC-D041F161170C}" type="datetime1">
               <a:rPr lang="en-US" smtClean="0"/>
-              <a:t>3/5/2016</a:t>
+              <a:t>3/14/2016</a:t>
             </a:fld>
             <a:endParaRPr lang="en-US" dirty="0"/>
           </a:p>
@@ -3546,7 +3546,7 @@
           <a:p>
             <a:fld id="{834C18EA-D952-4AE1-A6E7-E6731635F9D2}" type="datetime1">
               <a:rPr lang="en-US" smtClean="0"/>
-              <a:t>3/5/2016</a:t>
+              <a:t>3/14/2016</a:t>
             </a:fld>
             <a:endParaRPr lang="en-US" dirty="0"/>
           </a:p>
@@ -3805,7 +3805,7 @@
           <a:p>
             <a:fld id="{13032A52-9E14-487A-A3FB-E00D36231CE7}" type="datetime1">
               <a:rPr lang="en-US" smtClean="0"/>
-              <a:t>3/5/2016</a:t>
+              <a:t>3/14/2016</a:t>
             </a:fld>
             <a:endParaRPr lang="en-US" dirty="0"/>
           </a:p>
@@ -4049,7 +4049,7 @@
           <a:p>
             <a:fld id="{8C5CA72F-91C6-447B-8CFD-10CC50FBFEAC}" type="datetime1">
               <a:rPr lang="en-US" smtClean="0"/>
-              <a:t>3/5/2016</a:t>
+              <a:t>3/14/2016</a:t>
             </a:fld>
             <a:endParaRPr lang="en-US" dirty="0"/>
           </a:p>
@@ -4435,7 +4435,7 @@
           <a:p>
             <a:fld id="{2CCBA931-94B6-4C88-A7AC-0B43FAFFEEC1}" type="datetime1">
               <a:rPr lang="en-US" smtClean="0"/>
-              <a:t>3/5/2016</a:t>
+              <a:t>3/14/2016</a:t>
             </a:fld>
             <a:endParaRPr lang="en-US" dirty="0"/>
           </a:p>
@@ -4570,7 +4570,7 @@
           <a:p>
             <a:fld id="{A17CC6B2-4719-4EFD-BB2D-A2C62F0625B7}" type="datetime1">
               <a:rPr lang="en-US" smtClean="0"/>
-              <a:t>3/5/2016</a:t>
+              <a:t>3/14/2016</a:t>
             </a:fld>
             <a:endParaRPr lang="en-US" dirty="0"/>
           </a:p>
@@ -4677,7 +4677,7 @@
           <a:p>
             <a:fld id="{9AC4E54B-2176-4BC1-BC54-F80551EDB034}" type="datetime1">
               <a:rPr lang="en-US" smtClean="0"/>
-              <a:t>3/5/2016</a:t>
+              <a:t>3/14/2016</a:t>
             </a:fld>
             <a:endParaRPr lang="en-US" dirty="0"/>
           </a:p>
@@ -4944,7 +4944,7 @@
           <a:p>
             <a:fld id="{F73BBE7C-717C-4AB2-A881-24835FA94B24}" type="datetime1">
               <a:rPr lang="en-US" smtClean="0"/>
-              <a:t>3/5/2016</a:t>
+              <a:t>3/14/2016</a:t>
             </a:fld>
             <a:endParaRPr lang="en-US" dirty="0"/>
           </a:p>
@@ -5218,7 +5218,7 @@
           <a:p>
             <a:fld id="{BD6C4C3D-17A3-49F5-8381-0500C8735BF2}" type="datetime1">
               <a:rPr lang="en-US" smtClean="0"/>
-              <a:t>3/5/2016</a:t>
+              <a:t>3/14/2016</a:t>
             </a:fld>
             <a:endParaRPr lang="en-US" dirty="0"/>
           </a:p>
@@ -5973,7 +5973,7 @@
           <a:p>
             <a:fld id="{1D480221-EA8F-4F92-87B7-59E96BBC3974}" type="datetime1">
               <a:rPr lang="en-US" smtClean="0"/>
-              <a:t>3/5/2016</a:t>
+              <a:t>3/14/2016</a:t>
             </a:fld>
             <a:endParaRPr lang="en-US" dirty="0"/>
           </a:p>
@@ -7092,96 +7092,6 @@
       </p:sp>
       <p:sp>
         <p:nvSpPr>
-          <p:cNvPr id="3" name="Content Placeholder 2"/>
-          <p:cNvSpPr>
-            <a:spLocks noGrp="1"/>
-          </p:cNvSpPr>
-          <p:nvPr>
-            <p:ph sz="half" idx="1"/>
-          </p:nvPr>
-        </p:nvSpPr>
-        <p:spPr/>
-        <p:txBody>
-          <a:bodyPr>
-            <a:normAutofit fontScale="92500" lnSpcReduction="10000"/>
-          </a:bodyPr>
-          <a:lstStyle/>
-          <a:p>
-            <a:r>
-              <a:rPr lang="en-US" dirty="0"/>
-              <a:t>npm</a:t>
-            </a:r>
-          </a:p>
-          <a:p>
-            <a:pPr lvl="1"/>
-            <a:r>
-              <a:rPr lang="en-US" dirty="0"/>
-              <a:t>package.json</a:t>
-            </a:r>
-          </a:p>
-          <a:p>
-            <a:r>
-              <a:rPr lang="en-US" dirty="0"/>
-              <a:t>Bower</a:t>
-            </a:r>
-          </a:p>
-          <a:p>
-            <a:pPr lvl="1"/>
-            <a:r>
-              <a:rPr lang="en-US" dirty="0"/>
-              <a:t>bower.json</a:t>
-            </a:r>
-          </a:p>
-          <a:p>
-            <a:pPr lvl="1"/>
-            <a:r>
-              <a:rPr lang="en-US" dirty="0"/>
-              <a:t>.bowerrc</a:t>
-            </a:r>
-          </a:p>
-          <a:p>
-            <a:r>
-              <a:rPr lang="en-US" dirty="0"/>
-              <a:t>JSCS</a:t>
-            </a:r>
-          </a:p>
-          <a:p>
-            <a:pPr lvl="1"/>
-            <a:r>
-              <a:rPr lang="en-US" dirty="0"/>
-              <a:t>.jscsrc</a:t>
-            </a:r>
-          </a:p>
-          <a:p>
-            <a:r>
-              <a:rPr lang="en-US" dirty="0"/>
-              <a:t>JSHint</a:t>
-            </a:r>
-          </a:p>
-          <a:p>
-            <a:pPr lvl="1"/>
-            <a:r>
-              <a:rPr lang="en-US" dirty="0"/>
-              <a:t>.jshintrc</a:t>
-            </a:r>
-          </a:p>
-          <a:p>
-            <a:r>
-              <a:rPr lang="en-US" dirty="0"/>
-              <a:t>TypeScript</a:t>
-            </a:r>
-          </a:p>
-          <a:p>
-            <a:pPr lvl="1"/>
-            <a:r>
-              <a:rPr lang="en-US" dirty="0"/>
-              <a:t>tsconfig.json</a:t>
-            </a:r>
-          </a:p>
-        </p:txBody>
-      </p:sp>
-      <p:sp>
-        <p:nvSpPr>
           <p:cNvPr id="4" name="Slide Number Placeholder 3"/>
           <p:cNvSpPr>
             <a:spLocks noGrp="1"/>
@@ -7203,184 +7113,228 @@
           </a:p>
         </p:txBody>
       </p:sp>
+      <p:sp>
+        <p:nvSpPr>
+          <p:cNvPr id="7" name="Content Placeholder 6"/>
+          <p:cNvSpPr>
+            <a:spLocks noGrp="1"/>
+          </p:cNvSpPr>
+          <p:nvPr>
+            <p:ph sz="half" idx="1"/>
+          </p:nvPr>
+        </p:nvSpPr>
+        <p:spPr/>
+        <p:txBody>
+          <a:bodyPr/>
+          <a:lstStyle/>
+          <a:p>
+            <a:endParaRPr lang="en-US"/>
+          </a:p>
+        </p:txBody>
+      </p:sp>
       <p:pic>
         <p:nvPicPr>
-          <p:cNvPr id="1027" name="Picture 3"/>
+          <p:cNvPr id="8" name="Picture 7"/>
           <p:cNvPicPr>
-            <a:picLocks noChangeAspect="1" noChangeArrowheads="1"/>
+            <a:picLocks noChangeAspect="1"/>
           </p:cNvPicPr>
           <p:nvPr/>
         </p:nvPicPr>
         <p:blipFill>
-          <a:blip r:embed="rId2">
-            <a:extLst>
-              <a:ext uri="{28A0092B-C50C-407E-A947-70E740481C1C}">
-                <a14:useLocalDpi xmlns:a14="http://schemas.microsoft.com/office/drawing/2010/main" val="0"/>
-              </a:ext>
-            </a:extLst>
-          </a:blip>
-          <a:srcRect/>
+          <a:blip r:embed="rId2"/>
           <a:stretch>
             <a:fillRect/>
           </a:stretch>
         </p:blipFill>
-        <p:spPr bwMode="auto">
+        <p:spPr>
           <a:xfrm>
-            <a:off x="5357446" y="181830"/>
-            <a:ext cx="4962525" cy="6257925"/>
+            <a:off x="231553" y="1676400"/>
+            <a:ext cx="11728894" cy="6108700"/>
+          </a:xfrm>
+          <a:prstGeom prst="rect">
+            <a:avLst/>
+          </a:prstGeom>
+        </p:spPr>
+      </p:pic>
+    </p:spTree>
+    <p:extLst>
+      <p:ext uri="{BB962C8B-B14F-4D97-AF65-F5344CB8AC3E}">
+        <p14:creationId xmlns:p14="http://schemas.microsoft.com/office/powerpoint/2010/main" val="1301101843"/>
+      </p:ext>
+    </p:extLst>
+  </p:cSld>
+  <p:clrMapOvr>
+    <a:masterClrMapping/>
+  </p:clrMapOvr>
+  <mc:AlternateContent xmlns:mc="http://schemas.openxmlformats.org/markup-compatibility/2006" xmlns:p14="http://schemas.microsoft.com/office/powerpoint/2010/main">
+    <mc:Choice Requires="p14">
+      <p:transition p14:dur="250">
+        <p:fade/>
+      </p:transition>
+    </mc:Choice>
+    <mc:Fallback xmlns="">
+      <p:transition>
+        <p:fade/>
+      </p:transition>
+    </mc:Fallback>
+  </mc:AlternateContent>
+</p:sld>
+</file>
+
+<file path=ppt/slides/slide14.xml><?xml version="1.0" encoding="utf-8"?>
+<p:sld xmlns:a="http://schemas.openxmlformats.org/drawingml/2006/main" xmlns:r="http://schemas.openxmlformats.org/officeDocument/2006/relationships" xmlns:p="http://schemas.openxmlformats.org/presentationml/2006/main">
+  <p:cSld>
+    <p:spTree>
+      <p:nvGrpSpPr>
+        <p:cNvPr id="1" name=""/>
+        <p:cNvGrpSpPr/>
+        <p:nvPr/>
+      </p:nvGrpSpPr>
+      <p:grpSpPr>
+        <a:xfrm>
+          <a:off x="0" y="0"/>
+          <a:ext cx="0" cy="0"/>
+          <a:chOff x="0" y="0"/>
+          <a:chExt cx="0" cy="0"/>
+        </a:xfrm>
+      </p:grpSpPr>
+      <p:sp>
+        <p:nvSpPr>
+          <p:cNvPr id="6" name="Title 5"/>
+          <p:cNvSpPr>
+            <a:spLocks noGrp="1"/>
+          </p:cNvSpPr>
+          <p:nvPr>
+            <p:ph type="title"/>
+          </p:nvPr>
+        </p:nvSpPr>
+        <p:spPr/>
+        <p:txBody>
+          <a:bodyPr/>
+          <a:lstStyle/>
+          <a:p>
+            <a:r>
+              <a:rPr lang="en-US" dirty="0"/>
+              <a:t>package.json Schema Support</a:t>
+            </a:r>
+          </a:p>
+        </p:txBody>
+      </p:sp>
+      <p:sp>
+        <p:nvSpPr>
+          <p:cNvPr id="7" name="Content Placeholder 6"/>
+          <p:cNvSpPr>
+            <a:spLocks noGrp="1"/>
+          </p:cNvSpPr>
+          <p:nvPr>
+            <p:ph idx="1"/>
+          </p:nvPr>
+        </p:nvSpPr>
+        <p:spPr/>
+        <p:txBody>
+          <a:bodyPr/>
+          <a:lstStyle/>
+          <a:p>
+            <a:pPr marL="0" indent="0">
+              <a:buNone/>
+            </a:pPr>
+            <a:endParaRPr lang="en-US" dirty="0"/>
+          </a:p>
+        </p:txBody>
+      </p:sp>
+      <p:sp>
+        <p:nvSpPr>
+          <p:cNvPr id="5" name="Slide Number Placeholder 4"/>
+          <p:cNvSpPr>
+            <a:spLocks noGrp="1"/>
+          </p:cNvSpPr>
+          <p:nvPr>
+            <p:ph type="sldNum" sz="quarter" idx="12"/>
+          </p:nvPr>
+        </p:nvSpPr>
+        <p:spPr/>
+        <p:txBody>
+          <a:bodyPr/>
+          <a:lstStyle/>
+          <a:p>
+            <a:fld id="{CA6404EB-EC22-4A9F-B979-51DB938C35B6}" type="slidenum">
+              <a:rPr lang="en-US" smtClean="0"/>
+              <a:t>14</a:t>
+            </a:fld>
+            <a:endParaRPr lang="en-US" dirty="0"/>
+          </a:p>
+        </p:txBody>
+      </p:sp>
+      <p:pic>
+        <p:nvPicPr>
+          <p:cNvPr id="2" name="Picture 1"/>
+          <p:cNvPicPr>
+            <a:picLocks noChangeAspect="1"/>
+          </p:cNvPicPr>
+          <p:nvPr/>
+        </p:nvPicPr>
+        <p:blipFill>
+          <a:blip r:embed="rId2"/>
+          <a:stretch>
+            <a:fillRect/>
+          </a:stretch>
+        </p:blipFill>
+        <p:spPr>
+          <a:xfrm>
+            <a:off x="0" y="0"/>
+            <a:ext cx="12192000" cy="6858000"/>
+          </a:xfrm>
+          <a:prstGeom prst="rect">
+            <a:avLst/>
+          </a:prstGeom>
+        </p:spPr>
+      </p:pic>
+      <p:sp>
+        <p:nvSpPr>
+          <p:cNvPr id="8" name="Rectangle 7"/>
+          <p:cNvSpPr/>
+          <p:nvPr/>
+        </p:nvSpPr>
+        <p:spPr>
+          <a:xfrm>
+            <a:off x="1537370" y="2116397"/>
+            <a:ext cx="4984542" cy="2782607"/>
           </a:xfrm>
           <a:prstGeom prst="rect">
             <a:avLst/>
           </a:prstGeom>
           <a:noFill/>
-          <a:ln>
-            <a:noFill/>
-          </a:ln>
-          <a:effectLst/>
-          <a:extLst>
-            <a:ext uri="{909E8E84-426E-40DD-AFC4-6F175D3DCCD1}">
-              <a14:hiddenFill xmlns:a14="http://schemas.microsoft.com/office/drawing/2010/main">
-                <a:solidFill>
-                  <a:schemeClr val="accent1"/>
-                </a:solidFill>
-              </a14:hiddenFill>
-            </a:ext>
-            <a:ext uri="{91240B29-F687-4F45-9708-019B960494DF}">
-              <a14:hiddenLine xmlns:a14="http://schemas.microsoft.com/office/drawing/2010/main" w="9525">
-                <a:solidFill>
-                  <a:schemeClr val="tx1"/>
-                </a:solidFill>
-                <a:miter lim="800000"/>
-                <a:headEnd/>
-                <a:tailEnd/>
-              </a14:hiddenLine>
-            </a:ext>
-            <a:ext uri="{AF507438-7753-43E0-B8FC-AC1667EBCBE1}">
-              <a14:hiddenEffects xmlns:a14="http://schemas.microsoft.com/office/drawing/2010/main">
-                <a:effectLst>
-                  <a:outerShdw dist="35921" dir="2700000" algn="ctr" rotWithShape="0">
-                    <a:schemeClr val="bg2"/>
-                  </a:outerShdw>
-                </a:effectLst>
-              </a14:hiddenEffects>
-            </a:ext>
-          </a:extLst>
+          <a:ln w="38100"/>
         </p:spPr>
-      </p:pic>
-      <p:grpSp>
-        <p:nvGrpSpPr>
-          <p:cNvPr id="6" name="Group 5"/>
-          <p:cNvGrpSpPr/>
-          <p:nvPr/>
-        </p:nvGrpSpPr>
-        <p:grpSpPr>
-          <a:xfrm>
-            <a:off x="2825262" y="2160589"/>
-            <a:ext cx="7136248" cy="1127618"/>
-            <a:chOff x="2825262" y="2160589"/>
-            <a:chExt cx="7136248" cy="1127618"/>
-          </a:xfrm>
-        </p:grpSpPr>
-        <p:sp>
-          <p:nvSpPr>
-            <p:cNvPr id="10" name="Right Arrow 9"/>
-            <p:cNvSpPr/>
-            <p:nvPr/>
-          </p:nvSpPr>
-          <p:spPr>
-            <a:xfrm>
-              <a:off x="2825262" y="2368061"/>
-              <a:ext cx="3458307" cy="468923"/>
-            </a:xfrm>
-            <a:prstGeom prst="rightArrow">
-              <a:avLst/>
-            </a:prstGeom>
-            <a:ln>
-              <a:solidFill>
-                <a:schemeClr val="bg1"/>
-              </a:solidFill>
-            </a:ln>
-          </p:spPr>
-          <p:style>
-            <a:lnRef idx="2">
-              <a:schemeClr val="accent1">
-                <a:shade val="50000"/>
-              </a:schemeClr>
-            </a:lnRef>
-            <a:fillRef idx="1">
-              <a:schemeClr val="accent1"/>
-            </a:fillRef>
-            <a:effectRef idx="0">
-              <a:schemeClr val="accent1"/>
-            </a:effectRef>
-            <a:fontRef idx="minor">
-              <a:schemeClr val="lt1"/>
-            </a:fontRef>
-          </p:style>
-          <p:txBody>
-            <a:bodyPr rtlCol="0" anchor="ctr"/>
-            <a:lstStyle/>
-            <a:p>
-              <a:pPr algn="ctr"/>
-              <a:endParaRPr lang="en-US" dirty="0"/>
-            </a:p>
-          </p:txBody>
-        </p:sp>
-        <p:sp>
-          <p:nvSpPr>
-            <p:cNvPr id="5" name="Rectangle 4"/>
-            <p:cNvSpPr/>
-            <p:nvPr/>
-          </p:nvSpPr>
-          <p:spPr>
-            <a:xfrm>
-              <a:off x="6283569" y="2160589"/>
-              <a:ext cx="3677941" cy="1127618"/>
-            </a:xfrm>
-            <a:prstGeom prst="rect">
-              <a:avLst/>
-            </a:prstGeom>
-            <a:solidFill>
-              <a:schemeClr val="accent1">
-                <a:alpha val="0"/>
-              </a:schemeClr>
-            </a:solidFill>
-            <a:ln w="38100">
-              <a:solidFill>
-                <a:schemeClr val="bg1"/>
-              </a:solidFill>
-            </a:ln>
-          </p:spPr>
-          <p:style>
-            <a:lnRef idx="2">
-              <a:schemeClr val="accent1">
-                <a:shade val="50000"/>
-              </a:schemeClr>
-            </a:lnRef>
-            <a:fillRef idx="1">
-              <a:schemeClr val="accent1"/>
-            </a:fillRef>
-            <a:effectRef idx="0">
-              <a:schemeClr val="accent1"/>
-            </a:effectRef>
-            <a:fontRef idx="minor">
-              <a:schemeClr val="lt1"/>
-            </a:fontRef>
-          </p:style>
-          <p:txBody>
-            <a:bodyPr rtlCol="0" anchor="ctr"/>
-            <a:lstStyle/>
-            <a:p>
-              <a:pPr algn="ctr"/>
-              <a:endParaRPr lang="en-US" dirty="0"/>
-            </a:p>
-          </p:txBody>
-        </p:sp>
-      </p:grpSp>
+        <p:style>
+          <a:lnRef idx="2">
+            <a:schemeClr val="accent1">
+              <a:shade val="50000"/>
+            </a:schemeClr>
+          </a:lnRef>
+          <a:fillRef idx="1">
+            <a:schemeClr val="accent1"/>
+          </a:fillRef>
+          <a:effectRef idx="0">
+            <a:schemeClr val="accent1"/>
+          </a:effectRef>
+          <a:fontRef idx="minor">
+            <a:schemeClr val="lt1"/>
+          </a:fontRef>
+        </p:style>
+        <p:txBody>
+          <a:bodyPr rtlCol="0" anchor="ctr"/>
+          <a:lstStyle/>
+          <a:p>
+            <a:pPr algn="ctr"/>
+            <a:endParaRPr lang="en-US"/>
+          </a:p>
+        </p:txBody>
+      </p:sp>
     </p:spTree>
     <p:extLst>
       <p:ext uri="{BB962C8B-B14F-4D97-AF65-F5344CB8AC3E}">
-        <p14:creationId xmlns:p14="http://schemas.microsoft.com/office/powerpoint/2010/main" val="1301101843"/>
+        <p14:creationId xmlns:p14="http://schemas.microsoft.com/office/powerpoint/2010/main" val="47737439"/>
       </p:ext>
     </p:extLst>
   </p:cSld>
@@ -7420,7 +7374,7 @@
                             </p:stCondLst>
                             <p:childTnLst>
                               <p:par>
-                                <p:cTn id="5" presetID="1" presetClass="entr" presetSubtype="0" fill="hold" nodeType="clickEffect">
+                                <p:cTn id="5" presetID="1" presetClass="entr" presetSubtype="0" fill="hold" grpId="0" nodeType="clickEffect">
                                   <p:stCondLst>
                                     <p:cond delay="0"/>
                                   </p:stCondLst>
@@ -7433,7 +7387,7 @@
                                           </p:stCondLst>
                                         </p:cTn>
                                         <p:tgtEl>
-                                          <p:spTgt spid="6"/>
+                                          <p:spTgt spid="8"/>
                                         </p:tgtEl>
                                         <p:attrNameLst>
                                           <p:attrName>style.visibility</p:attrName>
@@ -7473,170 +7427,10 @@
         </p:cTn>
       </p:par>
     </p:tnLst>
+    <p:bldLst>
+      <p:bldP spid="8" grpId="0" animBg="1"/>
+    </p:bldLst>
   </p:timing>
-</p:sld>
-</file>
-
-<file path=ppt/slides/slide14.xml><?xml version="1.0" encoding="utf-8"?>
-<p:sld xmlns:a="http://schemas.openxmlformats.org/drawingml/2006/main" xmlns:r="http://schemas.openxmlformats.org/officeDocument/2006/relationships" xmlns:p="http://schemas.openxmlformats.org/presentationml/2006/main">
-  <p:cSld>
-    <p:spTree>
-      <p:nvGrpSpPr>
-        <p:cNvPr id="1" name=""/>
-        <p:cNvGrpSpPr/>
-        <p:nvPr/>
-      </p:nvGrpSpPr>
-      <p:grpSpPr>
-        <a:xfrm>
-          <a:off x="0" y="0"/>
-          <a:ext cx="0" cy="0"/>
-          <a:chOff x="0" y="0"/>
-          <a:chExt cx="0" cy="0"/>
-        </a:xfrm>
-      </p:grpSpPr>
-      <p:sp>
-        <p:nvSpPr>
-          <p:cNvPr id="6" name="Title 5"/>
-          <p:cNvSpPr>
-            <a:spLocks noGrp="1"/>
-          </p:cNvSpPr>
-          <p:nvPr>
-            <p:ph type="title"/>
-          </p:nvPr>
-        </p:nvSpPr>
-        <p:spPr/>
-        <p:txBody>
-          <a:bodyPr/>
-          <a:lstStyle/>
-          <a:p>
-            <a:r>
-              <a:rPr lang="en-US" dirty="0"/>
-              <a:t>package.json Schema Support</a:t>
-            </a:r>
-          </a:p>
-        </p:txBody>
-      </p:sp>
-      <p:sp>
-        <p:nvSpPr>
-          <p:cNvPr id="7" name="Content Placeholder 6"/>
-          <p:cNvSpPr>
-            <a:spLocks noGrp="1"/>
-          </p:cNvSpPr>
-          <p:nvPr>
-            <p:ph idx="1"/>
-          </p:nvPr>
-        </p:nvSpPr>
-        <p:spPr/>
-        <p:txBody>
-          <a:bodyPr/>
-          <a:lstStyle/>
-          <a:p>
-            <a:pPr marL="0" indent="0">
-              <a:buNone/>
-            </a:pPr>
-            <a:endParaRPr lang="en-US" dirty="0"/>
-          </a:p>
-        </p:txBody>
-      </p:sp>
-      <p:sp>
-        <p:nvSpPr>
-          <p:cNvPr id="5" name="Slide Number Placeholder 4"/>
-          <p:cNvSpPr>
-            <a:spLocks noGrp="1"/>
-          </p:cNvSpPr>
-          <p:nvPr>
-            <p:ph type="sldNum" sz="quarter" idx="12"/>
-          </p:nvPr>
-        </p:nvSpPr>
-        <p:spPr/>
-        <p:txBody>
-          <a:bodyPr/>
-          <a:lstStyle/>
-          <a:p>
-            <a:fld id="{CA6404EB-EC22-4A9F-B979-51DB938C35B6}" type="slidenum">
-              <a:rPr lang="en-US" smtClean="0"/>
-              <a:t>14</a:t>
-            </a:fld>
-            <a:endParaRPr lang="en-US" dirty="0"/>
-          </a:p>
-        </p:txBody>
-      </p:sp>
-      <p:pic>
-        <p:nvPicPr>
-          <p:cNvPr id="2051" name="Picture 3"/>
-          <p:cNvPicPr>
-            <a:picLocks noChangeAspect="1" noChangeArrowheads="1"/>
-          </p:cNvPicPr>
-          <p:nvPr/>
-        </p:nvPicPr>
-        <p:blipFill>
-          <a:blip r:embed="rId2">
-            <a:extLst>
-              <a:ext uri="{28A0092B-C50C-407E-A947-70E740481C1C}">
-                <a14:useLocalDpi xmlns:a14="http://schemas.microsoft.com/office/drawing/2010/main" val="0"/>
-              </a:ext>
-            </a:extLst>
-          </a:blip>
-          <a:srcRect/>
-          <a:stretch>
-            <a:fillRect/>
-          </a:stretch>
-        </p:blipFill>
-        <p:spPr bwMode="auto">
-          <a:xfrm>
-            <a:off x="545910" y="1222035"/>
-            <a:ext cx="10575176" cy="5635965"/>
-          </a:xfrm>
-          <a:prstGeom prst="rect">
-            <a:avLst/>
-          </a:prstGeom>
-          <a:noFill/>
-          <a:ln>
-            <a:noFill/>
-          </a:ln>
-          <a:extLst>
-            <a:ext uri="{909E8E84-426E-40DD-AFC4-6F175D3DCCD1}">
-              <a14:hiddenFill xmlns:a14="http://schemas.microsoft.com/office/drawing/2010/main">
-                <a:solidFill>
-                  <a:schemeClr val="accent1"/>
-                </a:solidFill>
-              </a14:hiddenFill>
-            </a:ext>
-            <a:ext uri="{91240B29-F687-4F45-9708-019B960494DF}">
-              <a14:hiddenLine xmlns:a14="http://schemas.microsoft.com/office/drawing/2010/main" w="9525">
-                <a:solidFill>
-                  <a:schemeClr val="tx1"/>
-                </a:solidFill>
-                <a:miter lim="800000"/>
-                <a:headEnd/>
-                <a:tailEnd/>
-              </a14:hiddenLine>
-            </a:ext>
-          </a:extLst>
-        </p:spPr>
-      </p:pic>
-    </p:spTree>
-    <p:extLst>
-      <p:ext uri="{BB962C8B-B14F-4D97-AF65-F5344CB8AC3E}">
-        <p14:creationId xmlns:p14="http://schemas.microsoft.com/office/powerpoint/2010/main" val="47737439"/>
-      </p:ext>
-    </p:extLst>
-  </p:cSld>
-  <p:clrMapOvr>
-    <a:masterClrMapping/>
-  </p:clrMapOvr>
-  <mc:AlternateContent xmlns:mc="http://schemas.openxmlformats.org/markup-compatibility/2006" xmlns:p14="http://schemas.microsoft.com/office/powerpoint/2010/main">
-    <mc:Choice Requires="p14">
-      <p:transition p14:dur="250">
-        <p:fade/>
-      </p:transition>
-    </mc:Choice>
-    <mc:Fallback xmlns="">
-      <p:transition>
-        <p:fade/>
-      </p:transition>
-    </mc:Fallback>
-  </mc:AlternateContent>
 </p:sld>
 </file>
 
@@ -8559,15 +8353,7 @@
           <a:p>
             <a:r>
               <a:rPr lang="en-US" dirty="0"/>
-              <a:t>Launched on April 29</a:t>
-            </a:r>
-            <a:r>
-              <a:rPr lang="en-US" baseline="30000" dirty="0"/>
-              <a:t>th</a:t>
-            </a:r>
-            <a:r>
-              <a:rPr lang="en-US" dirty="0"/>
-              <a:t> at </a:t>
+              <a:t>Launched on April 29, 2015 at </a:t>
             </a:r>
             <a:r>
               <a:rPr lang="en-US" spc="-100" dirty="0"/>
@@ -8588,8 +8374,13 @@
             <a:pPr lvl="1"/>
             <a:r>
               <a:rPr lang="en-US" dirty="0"/>
-              <a:t>Current = v0.10.8</a:t>
-            </a:r>
+              <a:t>Current </a:t>
+            </a:r>
+            <a:r>
+              <a:rPr lang="en-US"/>
+              <a:t>= v0.10.11</a:t>
+            </a:r>
+            <a:endParaRPr lang="en-US" dirty="0"/>
           </a:p>
           <a:p>
             <a:r>
@@ -11157,7 +10948,9 @@
         </p:nvSpPr>
         <p:spPr/>
         <p:txBody>
-          <a:bodyPr/>
+          <a:bodyPr>
+            <a:normAutofit lnSpcReduction="10000"/>
+          </a:bodyPr>
           <a:lstStyle/>
           <a:p>
             <a:r>
@@ -11181,6 +10974,20 @@
                 <a:hlinkClick r:id="rId4"/>
               </a:rPr>
               <a:t>VS Code Docs</a:t>
+            </a:r>
+            <a:endParaRPr lang="en-US" dirty="0"/>
+          </a:p>
+          <a:p>
+            <a:endParaRPr lang="en-US" dirty="0">
+              <a:hlinkClick r:id="rId3"/>
+            </a:endParaRPr>
+          </a:p>
+          <a:p>
+            <a:r>
+              <a:rPr lang="en-US" dirty="0">
+                <a:hlinkClick r:id="rId5"/>
+              </a:rPr>
+              <a:t>VS Code Source on GitHub</a:t>
             </a:r>
             <a:endParaRPr lang="en-US" dirty="0">
               <a:hlinkClick r:id="rId3"/>
@@ -11197,7 +11004,7 @@
           <a:p>
             <a:r>
               <a:rPr lang="en-US" dirty="0">
-                <a:hlinkClick r:id="rId5"/>
+                <a:hlinkClick r:id="rId6"/>
               </a:rPr>
               <a:t>Visual Studio Code</a:t>
             </a:r>
@@ -11225,18 +11032,11 @@
           <a:p>
             <a:r>
               <a:rPr lang="en-US" dirty="0">
-                <a:hlinkClick r:id="rId6"/>
+                <a:hlinkClick r:id="rId7"/>
               </a:rPr>
               <a:t>VS Code ES6 Sample Project</a:t>
             </a:r>
             <a:endParaRPr lang="en-US" dirty="0"/>
-          </a:p>
-          <a:p>
-            <a:pPr lvl="1"/>
-            <a:r>
-              <a:rPr lang="en-US" dirty="0"/>
-              <a:t>GitHub repo</a:t>
-            </a:r>
           </a:p>
           <a:p>
             <a:pPr marL="0" indent="0">
@@ -14674,7 +14474,7 @@
     <we:reference id="wa104379263" version="1.0.0.0" store="wa104379263" storeType="OMEX"/>
   </we:alternateReferences>
   <we:properties>
-    <we:property name="config" value="{&quot;display_lang&quot;:&quot;en&quot;,&quot;display_font&quot;:&quot;Consolas&quot;,&quot;syntax_color&quot;:{&quot;Reserved words&quot;:&quot;#0000ff&quot;,&quot;Built-in objects&quot;:&quot;#FF0000&quot;,&quot;Line comment&quot;:&quot;#008000&quot;,&quot;Block comment&quot;:&quot;#008000&quot;,&quot;Quotation&quot;:&quot;#FF00FF&quot;,&quot;Quotation 2&quot;:&quot;#FF00FF&quot;,&quot;Number&quot;:&quot;#800080&quot;},&quot;old_syntax_color&quot;:{&quot;Reserved words&quot;:&quot;#0000FF&quot;,&quot;Built-in objects&quot;:&quot;#FF0000&quot;,&quot;Line comment&quot;:&quot;#008000&quot;,&quot;Block comment&quot;:&quot;#008000&quot;,&quot;Quotation&quot;:&quot;#FF00FF&quot;,&quot;Quotation 2&quot;:&quot;#FF00FF&quot;,&quot;Number&quot;:&quot;#800080&quot;},&quot;show_line_number&quot;:true,&quot;code_lang&quot;:&quot;js&quot;,&quot;code&quot;:&quot;{\n    \&quot;compilerOptions\&quot;: {\n        \&quot;target\&quot;: \&quot;ES6\&quot;,\n        \&quot;module\&quot;: \&quot;commonjs\&quot;,\n        \&quot;experimentalDecorators\&quot;: true,\n        \&quot;diagnostics\&quot;: true\n    }\n}&quot;,&quot;ctags&quot;:{}}"/>
+    <we:property name="config" value="{&quot;display_lang&quot;:&quot;en&quot;,&quot;display_font&quot;:&quot;Consolas&quot;,&quot;syntax_color&quot;:{&quot;Reserved words&quot;:&quot;#0000ff&quot;,&quot;Built-in objects&quot;:&quot;#FF0000&quot;,&quot;Line comment&quot;:&quot;#008000&quot;,&quot;Block comment&quot;:&quot;#008000&quot;,&quot;Quotation&quot;:&quot;#FF00FF&quot;,&quot;Quotation 2&quot;:&quot;#FF00FF&quot;,&quot;Number&quot;:&quot;#800080&quot;},&quot;old_syntax_color&quot;:{&quot;Reserved words&quot;:&quot;#0000FF&quot;,&quot;Built-in objects&quot;:&quot;#FF0000&quot;,&quot;Line comment&quot;:&quot;#008000&quot;,&quot;Block comment&quot;:&quot;#008000&quot;,&quot;Quotation&quot;:&quot;#FF00FF&quot;,&quot;Quotation 2&quot;:&quot;#FF00FF&quot;,&quot;Number&quot;:&quot;#800080&quot;},&quot;show_line_number&quot;:true,&quot;code_lang&quot;:&quot;js&quot;,&quot;code&quot;:&quot;{\n    \&quot;compilerOptions\&quot;: {\n        \&quot;target\&quot;: \&quot;ES6\&quot;,\n        \&quot;module\&quot;: \&quot;commonjs\&quot;\n    },\n    \&quot;exclude\&quot;: [\n        \&quot;dist\&quot;\n    ],\n    \&quot;files\&quot;: [\n        \&quot;app.js\&quot;,\n        \&quot;model.js\&quot;\n    ]\n}&quot;,&quot;ctags&quot;:{}}"/>
   </we:properties>
   <we:bindings/>
   <we:snapshot xmlns:r="http://schemas.openxmlformats.org/officeDocument/2006/relationships" r:embed="rId1"/>

</xml_diff>

<commit_message>
Update MKE JS slide deck
</commit_message>
<xml_diff>
--- a/Intro to JavaScript Tooling in VS Code - MKEJS.pptx
+++ b/Intro to JavaScript Tooling in VS Code - MKEJS.pptx
@@ -238,7 +238,7 @@
           <a:p>
             <a:fld id="{669E24BE-8A14-406C-93AE-FEDF4702362B}" type="datetimeFigureOut">
               <a:rPr lang="en-US" smtClean="0"/>
-              <a:t>3/14/2016</a:t>
+              <a:t>3/15/2016</a:t>
             </a:fld>
             <a:endParaRPr lang="en-US" dirty="0"/>
           </a:p>
@@ -1311,7 +1311,7 @@
           <a:p>
             <a:fld id="{8008D7A7-D1E9-49FE-B288-75D755D02F1B}" type="datetime1">
               <a:rPr lang="en-US" smtClean="0"/>
-              <a:t>3/14/2016</a:t>
+              <a:t>3/15/2016</a:t>
             </a:fld>
             <a:endParaRPr lang="en-US" dirty="0"/>
           </a:p>
@@ -1574,7 +1574,7 @@
           <a:p>
             <a:fld id="{565130A9-CCEE-4E49-AF50-9A9178C093F5}" type="datetime1">
               <a:rPr lang="en-US" smtClean="0"/>
-              <a:t>3/14/2016</a:t>
+              <a:t>3/15/2016</a:t>
             </a:fld>
             <a:endParaRPr lang="en-US" dirty="0"/>
           </a:p>
@@ -1900,7 +1900,7 @@
           <a:p>
             <a:fld id="{5FFEE7F5-B2E5-489A-976D-734D7F853DE3}" type="datetime1">
               <a:rPr lang="en-US" smtClean="0"/>
-              <a:t>3/14/2016</a:t>
+              <a:t>3/15/2016</a:t>
             </a:fld>
             <a:endParaRPr lang="en-US" dirty="0"/>
           </a:p>
@@ -2253,7 +2253,7 @@
           <a:p>
             <a:fld id="{1DDC5727-5F18-4B62-81B5-C092F8CCA971}" type="datetime1">
               <a:rPr lang="en-US" smtClean="0"/>
-              <a:t>3/14/2016</a:t>
+              <a:t>3/15/2016</a:t>
             </a:fld>
             <a:endParaRPr lang="en-US" dirty="0"/>
           </a:p>
@@ -2579,7 +2579,7 @@
           <a:p>
             <a:fld id="{DD7596D5-BBCA-4EE5-AC34-2F838BA68892}" type="datetime1">
               <a:rPr lang="en-US" smtClean="0"/>
-              <a:t>3/14/2016</a:t>
+              <a:t>3/15/2016</a:t>
             </a:fld>
             <a:endParaRPr lang="en-US" dirty="0"/>
           </a:p>
@@ -2984,7 +2984,7 @@
           <a:p>
             <a:fld id="{C87E594A-105F-4330-BE78-40BFD5E05FF3}" type="datetime1">
               <a:rPr lang="en-US" smtClean="0"/>
-              <a:t>3/14/2016</a:t>
+              <a:t>3/15/2016</a:t>
             </a:fld>
             <a:endParaRPr lang="en-US" dirty="0"/>
           </a:p>
@@ -3166,7 +3166,7 @@
           <a:p>
             <a:fld id="{50DAB467-0635-440B-9BC4-DA322DD73B70}" type="datetime1">
               <a:rPr lang="en-US" smtClean="0"/>
-              <a:t>3/14/2016</a:t>
+              <a:t>3/15/2016</a:t>
             </a:fld>
             <a:endParaRPr lang="en-US" dirty="0"/>
           </a:p>
@@ -3358,7 +3358,7 @@
           <a:p>
             <a:fld id="{5E48D92D-E3A5-4B10-B1FC-D041F161170C}" type="datetime1">
               <a:rPr lang="en-US" smtClean="0"/>
-              <a:t>3/14/2016</a:t>
+              <a:t>3/15/2016</a:t>
             </a:fld>
             <a:endParaRPr lang="en-US" dirty="0"/>
           </a:p>
@@ -3546,7 +3546,7 @@
           <a:p>
             <a:fld id="{834C18EA-D952-4AE1-A6E7-E6731635F9D2}" type="datetime1">
               <a:rPr lang="en-US" smtClean="0"/>
-              <a:t>3/14/2016</a:t>
+              <a:t>3/15/2016</a:t>
             </a:fld>
             <a:endParaRPr lang="en-US" dirty="0"/>
           </a:p>
@@ -3805,7 +3805,7 @@
           <a:p>
             <a:fld id="{13032A52-9E14-487A-A3FB-E00D36231CE7}" type="datetime1">
               <a:rPr lang="en-US" smtClean="0"/>
-              <a:t>3/14/2016</a:t>
+              <a:t>3/15/2016</a:t>
             </a:fld>
             <a:endParaRPr lang="en-US" dirty="0"/>
           </a:p>
@@ -4049,7 +4049,7 @@
           <a:p>
             <a:fld id="{8C5CA72F-91C6-447B-8CFD-10CC50FBFEAC}" type="datetime1">
               <a:rPr lang="en-US" smtClean="0"/>
-              <a:t>3/14/2016</a:t>
+              <a:t>3/15/2016</a:t>
             </a:fld>
             <a:endParaRPr lang="en-US" dirty="0"/>
           </a:p>
@@ -4435,7 +4435,7 @@
           <a:p>
             <a:fld id="{2CCBA931-94B6-4C88-A7AC-0B43FAFFEEC1}" type="datetime1">
               <a:rPr lang="en-US" smtClean="0"/>
-              <a:t>3/14/2016</a:t>
+              <a:t>3/15/2016</a:t>
             </a:fld>
             <a:endParaRPr lang="en-US" dirty="0"/>
           </a:p>
@@ -4570,7 +4570,7 @@
           <a:p>
             <a:fld id="{A17CC6B2-4719-4EFD-BB2D-A2C62F0625B7}" type="datetime1">
               <a:rPr lang="en-US" smtClean="0"/>
-              <a:t>3/14/2016</a:t>
+              <a:t>3/15/2016</a:t>
             </a:fld>
             <a:endParaRPr lang="en-US" dirty="0"/>
           </a:p>
@@ -4677,7 +4677,7 @@
           <a:p>
             <a:fld id="{9AC4E54B-2176-4BC1-BC54-F80551EDB034}" type="datetime1">
               <a:rPr lang="en-US" smtClean="0"/>
-              <a:t>3/14/2016</a:t>
+              <a:t>3/15/2016</a:t>
             </a:fld>
             <a:endParaRPr lang="en-US" dirty="0"/>
           </a:p>
@@ -4944,7 +4944,7 @@
           <a:p>
             <a:fld id="{F73BBE7C-717C-4AB2-A881-24835FA94B24}" type="datetime1">
               <a:rPr lang="en-US" smtClean="0"/>
-              <a:t>3/14/2016</a:t>
+              <a:t>3/15/2016</a:t>
             </a:fld>
             <a:endParaRPr lang="en-US" dirty="0"/>
           </a:p>
@@ -5218,7 +5218,7 @@
           <a:p>
             <a:fld id="{BD6C4C3D-17A3-49F5-8381-0500C8735BF2}" type="datetime1">
               <a:rPr lang="en-US" smtClean="0"/>
-              <a:t>3/14/2016</a:t>
+              <a:t>3/15/2016</a:t>
             </a:fld>
             <a:endParaRPr lang="en-US" dirty="0"/>
           </a:p>
@@ -5973,7 +5973,7 @@
           <a:p>
             <a:fld id="{1D480221-EA8F-4F92-87B7-59E96BBC3974}" type="datetime1">
               <a:rPr lang="en-US" smtClean="0"/>
-              <a:t>3/14/2016</a:t>
+              <a:t>3/15/2016</a:t>
             </a:fld>
             <a:endParaRPr lang="en-US" dirty="0"/>
           </a:p>
@@ -6657,8 +6657,8 @@
           </a:p>
         </p:txBody>
       </p:sp>
-      <mc:AlternateContent xmlns:mc="http://schemas.openxmlformats.org/markup-compatibility/2006" xmlns:we="http://schemas.microsoft.com/office/webextensions/webextension/2010/11" xmlns:pca="http://schemas.microsoft.com/office/powerpoint/2013/contentapp">
-        <mc:Choice Requires="we pca">
+      <mc:AlternateContent xmlns:mc="http://schemas.openxmlformats.org/markup-compatibility/2006">
+        <mc:Choice xmlns:we="http://schemas.microsoft.com/office/webextensions/webextension/2010/11" xmlns:pca="http://schemas.microsoft.com/office/powerpoint/2013/contentapp" Requires="we pca">
           <p:graphicFrame>
             <p:nvGraphicFramePr>
               <p:cNvPr id="5" name="Content Placeholder 4" title="Code Presenter Pro"/>
@@ -6685,7 +6685,7 @@
             </a:graphic>
           </p:graphicFrame>
         </mc:Choice>
-        <mc:Fallback xmlns="">
+        <mc:Fallback>
           <p:pic>
             <p:nvPicPr>
               <p:cNvPr id="5" name="Content Placeholder 4" title="Code Presenter Pro"/>
@@ -6799,8 +6799,8 @@
           </a:p>
         </p:txBody>
       </p:sp>
-      <mc:AlternateContent xmlns:mc="http://schemas.openxmlformats.org/markup-compatibility/2006" xmlns:we="http://schemas.microsoft.com/office/webextensions/webextension/2010/11" xmlns:pca="http://schemas.microsoft.com/office/powerpoint/2013/contentapp">
-        <mc:Choice Requires="we pca">
+      <mc:AlternateContent xmlns:mc="http://schemas.openxmlformats.org/markup-compatibility/2006">
+        <mc:Choice xmlns:we="http://schemas.microsoft.com/office/webextensions/webextension/2010/11" xmlns:pca="http://schemas.microsoft.com/office/powerpoint/2013/contentapp" Requires="we pca">
           <p:graphicFrame>
             <p:nvGraphicFramePr>
               <p:cNvPr id="5" name="Content Placeholder 4" title="Code Presenter Pro"/>
@@ -6827,7 +6827,7 @@
             </a:graphic>
           </p:graphicFrame>
         </mc:Choice>
-        <mc:Fallback xmlns="">
+        <mc:Fallback>
           <p:pic>
             <p:nvPicPr>
               <p:cNvPr id="5" name="Content Placeholder 4" title="Code Presenter Pro"/>
@@ -6941,8 +6941,8 @@
           </a:p>
         </p:txBody>
       </p:sp>
-      <mc:AlternateContent xmlns:mc="http://schemas.openxmlformats.org/markup-compatibility/2006" xmlns:we="http://schemas.microsoft.com/office/webextensions/webextension/2010/11" xmlns:pca="http://schemas.microsoft.com/office/powerpoint/2013/contentapp">
-        <mc:Choice Requires="we pca">
+      <mc:AlternateContent xmlns:mc="http://schemas.openxmlformats.org/markup-compatibility/2006">
+        <mc:Choice xmlns:we="http://schemas.microsoft.com/office/webextensions/webextension/2010/11" xmlns:pca="http://schemas.microsoft.com/office/powerpoint/2013/contentapp" Requires="we pca">
           <p:graphicFrame>
             <p:nvGraphicFramePr>
               <p:cNvPr id="5" name="Content Placeholder 4" title="Code Presenter Pro"/>
@@ -6969,7 +6969,7 @@
             </a:graphic>
           </p:graphicFrame>
         </mc:Choice>
-        <mc:Fallback xmlns="">
+        <mc:Fallback>
           <p:pic>
             <p:nvPicPr>
               <p:cNvPr id="5" name="Content Placeholder 4" title="Code Presenter Pro"/>
@@ -7752,15 +7752,47 @@
               <a:t>Reliance on </a:t>
             </a:r>
             <a:r>
-              <a:rPr lang="en-US" dirty="0">
+              <a:rPr lang="en-US" dirty="0" err="1"/>
+              <a:t>TypeScript</a:t>
+            </a:r>
+            <a:r>
+              <a:rPr lang="en-US" dirty="0"/>
+              <a:t> definitions manager</a:t>
+            </a:r>
+          </a:p>
+          <a:p>
+            <a:pPr lvl="1"/>
+            <a:r>
+              <a:rPr lang="en-US" b="1" dirty="0"/>
+              <a:t>Previously:</a:t>
+            </a:r>
+            <a:r>
+              <a:rPr lang="en-US" dirty="0"/>
+              <a:t> </a:t>
+            </a:r>
+            <a:r>
+              <a:rPr lang="en-US" dirty="0" err="1"/>
+              <a:t>DefinitelyTyped</a:t>
+            </a:r>
+            <a:endParaRPr lang="en-US" dirty="0"/>
+          </a:p>
+          <a:p>
+            <a:pPr lvl="1"/>
+            <a:r>
+              <a:rPr lang="en-US" b="1" dirty="0"/>
+              <a:t>Now:</a:t>
+            </a:r>
+            <a:r>
+              <a:rPr lang="en-US" dirty="0"/>
+              <a:t> </a:t>
+            </a:r>
+            <a:r>
+              <a:rPr lang="en-US" dirty="0" err="1">
                 <a:hlinkClick r:id="rId3"/>
               </a:rPr>
-              <a:t>DefinitelyTyped</a:t>
-            </a:r>
-            <a:r>
-              <a:rPr lang="en-US" dirty="0"/>
-              <a:t> project</a:t>
-            </a:r>
+              <a:t>Typings</a:t>
+            </a:r>
+            <a:endParaRPr lang="en-US" dirty="0"/>
           </a:p>
           <a:p>
             <a:endParaRPr lang="en-US" b="1" dirty="0"/>
@@ -7772,8 +7804,13 @@
             </a:r>
             <a:r>
               <a:rPr lang="en-US" dirty="0"/>
-              <a:t> TypeScript Definition Manager</a:t>
-            </a:r>
+              <a:t> </a:t>
+            </a:r>
+            <a:r>
+              <a:rPr lang="en-US" dirty="0" err="1"/>
+              <a:t>Typings</a:t>
+            </a:r>
+            <a:endParaRPr lang="en-US" dirty="0"/>
           </a:p>
           <a:p>
             <a:pPr lvl="1"/>
@@ -7789,8 +7826,19 @@
                 <a:latin typeface="Consolas" panose="020B0609020204030204" pitchFamily="49" charset="0"/>
                 <a:cs typeface="Consolas" panose="020B0609020204030204" pitchFamily="49" charset="0"/>
               </a:rPr>
-              <a:t> npm install –g tsd</a:t>
-            </a:r>
+              <a:t> npm install –g </a:t>
+            </a:r>
+            <a:r>
+              <a:rPr lang="en-US" dirty="0" err="1">
+                <a:latin typeface="Consolas" panose="020B0609020204030204" pitchFamily="49" charset="0"/>
+                <a:cs typeface="Consolas" panose="020B0609020204030204" pitchFamily="49" charset="0"/>
+              </a:rPr>
+              <a:t>typings</a:t>
+            </a:r>
+            <a:endParaRPr lang="en-US" dirty="0">
+              <a:latin typeface="Consolas" panose="020B0609020204030204" pitchFamily="49" charset="0"/>
+              <a:cs typeface="Consolas" panose="020B0609020204030204" pitchFamily="49" charset="0"/>
+            </a:endParaRPr>
           </a:p>
           <a:p>
             <a:pPr lvl="1"/>
@@ -8356,12 +8404,16 @@
               <a:t>Launched on April 29, 2015 at </a:t>
             </a:r>
             <a:r>
-              <a:rPr lang="en-US" spc="-100" dirty="0"/>
+              <a:rPr lang="en-US" b="1" spc="-100" dirty="0"/>
               <a:t>//</a:t>
             </a:r>
             <a:r>
+              <a:rPr lang="en-US" b="1" dirty="0"/>
+              <a:t>Build/</a:t>
+            </a:r>
+            <a:r>
               <a:rPr lang="en-US" dirty="0"/>
-              <a:t>Build/ conference</a:t>
+              <a:t> conference</a:t>
             </a:r>
           </a:p>
           <a:p>
@@ -8374,13 +8426,8 @@
             <a:pPr lvl="1"/>
             <a:r>
               <a:rPr lang="en-US" dirty="0"/>
-              <a:t>Current </a:t>
-            </a:r>
-            <a:r>
-              <a:rPr lang="en-US"/>
-              <a:t>= v0.10.11</a:t>
-            </a:r>
-            <a:endParaRPr lang="en-US" dirty="0"/>
+              <a:t>Current = v0.10.11</a:t>
+            </a:r>
           </a:p>
           <a:p>
             <a:r>
@@ -9771,8 +9818,8 @@
           </a:p>
         </p:txBody>
       </p:sp>
-      <mc:AlternateContent xmlns:mc="http://schemas.openxmlformats.org/markup-compatibility/2006" xmlns:we="http://schemas.microsoft.com/office/webextensions/webextension/2010/11" xmlns:pca="http://schemas.microsoft.com/office/powerpoint/2013/contentapp">
-        <mc:Choice Requires="we pca">
+      <mc:AlternateContent xmlns:mc="http://schemas.openxmlformats.org/markup-compatibility/2006">
+        <mc:Choice xmlns:we="http://schemas.microsoft.com/office/webextensions/webextension/2010/11" xmlns:pca="http://schemas.microsoft.com/office/powerpoint/2013/contentapp" Requires="we pca">
           <p:graphicFrame>
             <p:nvGraphicFramePr>
               <p:cNvPr id="5" name="Content Placeholder 4" title="Code Presenter Pro"/>
@@ -9799,7 +9846,7 @@
             </a:graphic>
           </p:graphicFrame>
         </mc:Choice>
-        <mc:Fallback xmlns="">
+        <mc:Fallback>
           <p:pic>
             <p:nvPicPr>
               <p:cNvPr id="5" name="Content Placeholder 4" title="Code Presenter Pro"/>
@@ -10207,8 +10254,8 @@
           </a:p>
         </p:txBody>
       </p:sp>
-      <mc:AlternateContent xmlns:mc="http://schemas.openxmlformats.org/markup-compatibility/2006" xmlns:we="http://schemas.microsoft.com/office/webextensions/webextension/2010/11" xmlns:pca="http://schemas.microsoft.com/office/powerpoint/2013/contentapp">
-        <mc:Choice Requires="we pca">
+      <mc:AlternateContent xmlns:mc="http://schemas.openxmlformats.org/markup-compatibility/2006">
+        <mc:Choice xmlns:we="http://schemas.microsoft.com/office/webextensions/webextension/2010/11" xmlns:pca="http://schemas.microsoft.com/office/powerpoint/2013/contentapp" Requires="we pca">
           <p:graphicFrame>
             <p:nvGraphicFramePr>
               <p:cNvPr id="2" name="Add-in 1" title="Code Presenter Pro"/>
@@ -10234,7 +10281,7 @@
             </a:graphic>
           </p:graphicFrame>
         </mc:Choice>
-        <mc:Fallback xmlns="">
+        <mc:Fallback>
           <p:pic>
             <p:nvPicPr>
               <p:cNvPr id="2" name="Add-in 1" title="Code Presenter Pro"/>
@@ -13218,6 +13265,12 @@
           <a:lstStyle/>
           <a:p>
             <a:r>
+              <a:rPr lang="en-US" dirty="0"/>
+              <a:t>Introduced in v0.10.1</a:t>
+            </a:r>
+          </a:p>
+          <a:p>
+            <a:r>
               <a:rPr lang="en-US" dirty="0">
                 <a:hlinkClick r:id="rId2"/>
               </a:rPr>
@@ -13235,12 +13288,6 @@
             <a:endParaRPr lang="en-US" dirty="0"/>
           </a:p>
           <a:p>
-            <a:r>
-              <a:rPr lang="en-US" dirty="0"/>
-              <a:t>Introduced in v0.10.1</a:t>
-            </a:r>
-          </a:p>
-          <a:p>
             <a:endParaRPr lang="en-US" dirty="0"/>
           </a:p>
         </p:txBody>
@@ -13268,6 +13315,30 @@
           </a:p>
         </p:txBody>
       </p:sp>
+      <p:pic>
+        <p:nvPicPr>
+          <p:cNvPr id="3" name="Picture 2"/>
+          <p:cNvPicPr>
+            <a:picLocks noChangeAspect="1"/>
+          </p:cNvPicPr>
+          <p:nvPr/>
+        </p:nvPicPr>
+        <p:blipFill>
+          <a:blip r:embed="rId3"/>
+          <a:stretch>
+            <a:fillRect/>
+          </a:stretch>
+        </p:blipFill>
+        <p:spPr>
+          <a:xfrm>
+            <a:off x="1" y="2962045"/>
+            <a:ext cx="12192000" cy="4907290"/>
+          </a:xfrm>
+          <a:prstGeom prst="rect">
+            <a:avLst/>
+          </a:prstGeom>
+        </p:spPr>
+      </p:pic>
     </p:spTree>
     <p:extLst>
       <p:ext uri="{BB962C8B-B14F-4D97-AF65-F5344CB8AC3E}">
@@ -13846,8 +13917,8 @@
           </a:p>
         </p:txBody>
       </p:sp>
-      <mc:AlternateContent xmlns:mc="http://schemas.openxmlformats.org/markup-compatibility/2006" xmlns:we="http://schemas.microsoft.com/office/webextensions/webextension/2010/11" xmlns:pca="http://schemas.microsoft.com/office/powerpoint/2013/contentapp">
-        <mc:Choice Requires="we pca">
+      <mc:AlternateContent xmlns:mc="http://schemas.openxmlformats.org/markup-compatibility/2006">
+        <mc:Choice xmlns:we="http://schemas.microsoft.com/office/webextensions/webextension/2010/11" xmlns:pca="http://schemas.microsoft.com/office/powerpoint/2013/contentapp" Requires="we pca">
           <p:graphicFrame>
             <p:nvGraphicFramePr>
               <p:cNvPr id="5" name="Content Placeholder 4" title="Code Presenter Pro"/>
@@ -13874,7 +13945,7 @@
             </a:graphic>
           </p:graphicFrame>
         </mc:Choice>
-        <mc:Fallback xmlns="">
+        <mc:Fallback>
           <p:pic>
             <p:nvPicPr>
               <p:cNvPr id="5" name="Content Placeholder 4" title="Code Presenter Pro"/>
@@ -14488,7 +14559,7 @@
     <we:reference id="wa104379263" version="1.0.0.0" store="wa104379263" storeType="OMEX"/>
   </we:alternateReferences>
   <we:properties>
-    <we:property name="config" value="{&quot;display_lang&quot;:&quot;en&quot;,&quot;display_font&quot;:&quot;Consolas&quot;,&quot;syntax_color&quot;:{&quot;Reserved words&quot;:&quot;#0000ff&quot;,&quot;Built-in objects&quot;:&quot;#FF0000&quot;,&quot;Line comment&quot;:&quot;#008000&quot;,&quot;Block comment&quot;:&quot;#008000&quot;,&quot;Quotation&quot;:&quot;#FF00FF&quot;,&quot;Quotation 2&quot;:&quot;#FF00FF&quot;,&quot;Number&quot;:&quot;#800080&quot;},&quot;old_syntax_color&quot;:{&quot;Reserved words&quot;:&quot;#0000FF&quot;,&quot;Built-in objects&quot;:&quot;#FF0000&quot;,&quot;Line comment&quot;:&quot;#008000&quot;,&quot;Block comment&quot;:&quot;#008000&quot;,&quot;Quotation&quot;:&quot;#FF00FF&quot;,&quot;Quotation 2&quot;:&quot;#FF00FF&quot;,&quot;Number&quot;:&quot;#800080&quot;},&quot;show_line_number&quot;:true,&quot;code_lang&quot;:&quot;js&quot;,&quot;code&quot;:&quot;{\n    \&quot;version\&quot;: \&quot;0.1.0\&quot;,\n    \&quot;configurations\&quot;: [\n        {\n            \&quot;name\&quot;: \&quot;Debug Mocha Test\&quot;,\n            \&quot;type\&quot;: \&quot;node\&quot;,\n            \&quot;address\&quot;: \&quot;localhost\&quot;,\n            \&quot;port\&quot;: 5858,\n            \&quot;sourceMaps\&quot;: false\n        }\n    ]\n}&quot;,&quot;ctags&quot;:{}}"/>
+    <we:property name="config" value="{&quot;display_lang&quot;:&quot;en&quot;,&quot;display_font&quot;:&quot;Consolas&quot;,&quot;syntax_color&quot;:{&quot;Reserved words&quot;:&quot;#0000ff&quot;,&quot;Built-in objects&quot;:&quot;#FF0000&quot;,&quot;Line comment&quot;:&quot;#008000&quot;,&quot;Block comment&quot;:&quot;#008000&quot;,&quot;Quotation&quot;:&quot;#FF00FF&quot;,&quot;Quotation 2&quot;:&quot;#FF00FF&quot;,&quot;Number&quot;:&quot;#800080&quot;},&quot;old_syntax_color&quot;:{&quot;Reserved words&quot;:&quot;#0000FF&quot;,&quot;Built-in objects&quot;:&quot;#FF0000&quot;,&quot;Line comment&quot;:&quot;#008000&quot;,&quot;Block comment&quot;:&quot;#008000&quot;,&quot;Quotation&quot;:&quot;#FF00FF&quot;,&quot;Quotation 2&quot;:&quot;#FF00FF&quot;,&quot;Number&quot;:&quot;#800080&quot;},&quot;show_line_number&quot;:true,&quot;code_lang&quot;:&quot;js&quot;,&quot;code&quot;:&quot;{\n    \&quot;version\&quot;: \&quot;0.1.0\&quot;,\n    \&quot;configurations\&quot;: [\n        {\n            \&quot;name\&quot;: \&quot;Attach\&quot;,\n            \&quot;type\&quot;: \&quot;node\&quot;,\n            \&quot;request\&quot;: \&quot;attach\&quot;,\n            \&quot;port\&quot;: 5858,\n            \&quot;address\&quot;: \&quot;localhost\&quot;,\n            \&quot;restart\&quot;: false,\n            \&quot;sourceMaps\&quot;: false,\n            \&quot;outDir\&quot;: null,\n            \&quot;localRoot\&quot;: \&quot;${workspaceRoot}\&quot;,\n            \&quot;remoteRoot\&quot;: null\n        }\n    ]\n}&quot;,&quot;ctags&quot;:{}}"/>
   </we:properties>
   <we:bindings/>
   <we:snapshot xmlns:r="http://schemas.openxmlformats.org/officeDocument/2006/relationships" r:embed="rId1"/>
@@ -14502,7 +14573,7 @@
     <we:reference id="wa104379263" version="1.0.0.0" store="wa104379263" storeType="OMEX"/>
   </we:alternateReferences>
   <we:properties>
-    <we:property name="config" value="{&quot;display_lang&quot;:&quot;en&quot;,&quot;display_font&quot;:&quot;Consolas&quot;,&quot;syntax_color&quot;:{&quot;Reserved words&quot;:&quot;#0000ff&quot;,&quot;Built-in objects&quot;:&quot;#FF0000&quot;,&quot;Line comment&quot;:&quot;#008000&quot;,&quot;Block comment&quot;:&quot;#008000&quot;,&quot;Quotation&quot;:&quot;#FF00FF&quot;,&quot;Quotation 2&quot;:&quot;#FF00FF&quot;,&quot;Number&quot;:&quot;#800080&quot;},&quot;old_syntax_color&quot;:{&quot;Reserved words&quot;:&quot;#0000FF&quot;,&quot;Built-in objects&quot;:&quot;#FF0000&quot;,&quot;Line comment&quot;:&quot;#008000&quot;,&quot;Block comment&quot;:&quot;#008000&quot;,&quot;Quotation&quot;:&quot;#FF00FF&quot;,&quot;Quotation 2&quot;:&quot;#FF00FF&quot;,&quot;Number&quot;:&quot;#800080&quot;},&quot;show_line_number&quot;:true,&quot;code_lang&quot;:&quot;js&quot;,&quot;code&quot;:&quot;{\n    \&quot;javascript.validate.lint.missingSemicolon\&quot;: \&quot;error\&quot;,\n    \&quot;javascript.validate.lint.undeclaredVariables\&quot;: \&quot;error\&quot;,\n    \&quot;css.lint.ieHack\&quot;: \&quot;error\&quot;,\n    \&quot;editor.tabSize\&quot;: 2,\n    \&quot;jshint.enable\&quot;: true,\n    \&quot;files.trimTrailingWhitespace\&quot;: true,\n    \&quot;telemetry.enableCrashReporter\&quot;: false\n}&quot;,&quot;ctags&quot;:{}}"/>
+    <we:property name="config" value="{&quot;display_lang&quot;:&quot;en&quot;,&quot;display_font&quot;:&quot;Consolas&quot;,&quot;syntax_color&quot;:{&quot;Reserved words&quot;:&quot;#0000ff&quot;,&quot;Built-in objects&quot;:&quot;#FF0000&quot;,&quot;Line comment&quot;:&quot;#008000&quot;,&quot;Block comment&quot;:&quot;#008000&quot;,&quot;Quotation&quot;:&quot;#FF00FF&quot;,&quot;Quotation 2&quot;:&quot;#FF00FF&quot;,&quot;Number&quot;:&quot;#800080&quot;},&quot;old_syntax_color&quot;:{&quot;Reserved words&quot;:&quot;#0000FF&quot;,&quot;Built-in objects&quot;:&quot;#FF0000&quot;,&quot;Line comment&quot;:&quot;#008000&quot;,&quot;Block comment&quot;:&quot;#008000&quot;,&quot;Quotation&quot;:&quot;#FF00FF&quot;,&quot;Quotation 2&quot;:&quot;#FF00FF&quot;,&quot;Number&quot;:&quot;#800080&quot;},&quot;show_line_number&quot;:true,&quot;code_lang&quot;:&quot;js&quot;,&quot;code&quot;:&quot;{\n    \&quot;css.lint.ieHack\&quot;: \&quot;ignore\&quot;,\n    \&quot;editor.tabSize\&quot;: 2,\n    \&quot;jshint.enable\&quot;: true,\n    \&quot;files.autoSave\&quot;: \&quot;off\&quot;,\n    \&quot;files.trimTrailingWhitespace\&quot;: true,\n    \&quot;telemetry.enableCrashReporter\&quot;: false\n}&quot;,&quot;ctags&quot;:{}}"/>
   </we:properties>
   <we:bindings/>
   <we:snapshot xmlns:r="http://schemas.openxmlformats.org/officeDocument/2006/relationships" r:embed="rId1"/>

</xml_diff>

<commit_message>
Update native task runner slide
</commit_message>
<xml_diff>
--- a/Intro to JavaScript Tooling in VS Code - MKEJS.pptx
+++ b/Intro to JavaScript Tooling in VS Code - MKEJS.pptx
@@ -7084,9 +7084,24 @@
               <a:rPr lang="en-US" dirty="0"/>
             </a:br>
             <a:r>
-              <a:rPr lang="en-US" sz="2000" dirty="0"/>
-              <a:t>json.schemastore.org</a:t>
-            </a:r>
+              <a:rPr lang="en-US" sz="2000" dirty="0">
+                <a:hlinkClick r:id="rId2"/>
+              </a:rPr>
+              <a:t>schemastore.org/</a:t>
+            </a:r>
+            <a:r>
+              <a:rPr lang="en-US" sz="2000" dirty="0" err="1">
+                <a:hlinkClick r:id="rId2"/>
+              </a:rPr>
+              <a:t>json</a:t>
+            </a:r>
+            <a:r>
+              <a:rPr lang="en-US" sz="2000" dirty="0">
+                <a:hlinkClick r:id="rId2"/>
+              </a:rPr>
+              <a:t>/</a:t>
+            </a:r>
+            <a:endParaRPr lang="en-US" sz="2000" dirty="0"/>
           </a:p>
         </p:txBody>
       </p:sp>
@@ -7141,7 +7156,7 @@
           <p:nvPr/>
         </p:nvPicPr>
         <p:blipFill>
-          <a:blip r:embed="rId2"/>
+          <a:blip r:embed="rId3"/>
           <a:stretch>
             <a:fillRect/>
           </a:stretch>
@@ -7521,17 +7536,17 @@
             <a:pPr lvl="1"/>
             <a:r>
               <a:rPr lang="en-US" b="1" dirty="0"/>
-              <a:t>Previously:</a:t>
+              <a:t>Deprecated:</a:t>
             </a:r>
             <a:r>
               <a:rPr lang="en-US" dirty="0"/>
               <a:t> </a:t>
             </a:r>
             <a:r>
-              <a:rPr lang="en-US" dirty="0" err="1">
+              <a:rPr lang="en-US" dirty="0">
                 <a:hlinkClick r:id="rId3"/>
               </a:rPr>
-              <a:t>DefinitelyTyped</a:t>
+              <a:t>TSD</a:t>
             </a:r>
             <a:endParaRPr lang="en-US" dirty="0"/>
           </a:p>
@@ -7634,36 +7649,6 @@
           </a:p>
         </p:txBody>
       </p:sp>
-      <p:pic>
-        <p:nvPicPr>
-          <p:cNvPr id="9" name="Picture 8"/>
-          <p:cNvPicPr>
-            <a:picLocks noChangeAspect="1"/>
-          </p:cNvPicPr>
-          <p:nvPr/>
-        </p:nvPicPr>
-        <p:blipFill>
-          <a:blip r:embed="rId5">
-            <a:extLst>
-              <a:ext uri="{28A0092B-C50C-407E-A947-70E740481C1C}">
-                <a14:useLocalDpi xmlns:a14="http://schemas.microsoft.com/office/drawing/2010/main" val="0"/>
-              </a:ext>
-            </a:extLst>
-          </a:blip>
-          <a:stretch>
-            <a:fillRect/>
-          </a:stretch>
-        </p:blipFill>
-        <p:spPr>
-          <a:xfrm>
-            <a:off x="7343486" y="1124878"/>
-            <a:ext cx="3495238" cy="1123810"/>
-          </a:xfrm>
-          <a:prstGeom prst="rect">
-            <a:avLst/>
-          </a:prstGeom>
-        </p:spPr>
-      </p:pic>
     </p:spTree>
     <p:extLst>
       <p:ext uri="{BB962C8B-B14F-4D97-AF65-F5344CB8AC3E}">
@@ -8011,18 +7996,9 @@
               <a:rPr lang="en-US" dirty="0"/>
             </a:br>
             <a:r>
-              <a:rPr lang="en-US" sz="1800" dirty="0">
-                <a:solidFill>
-                  <a:schemeClr val="tx1"/>
-                </a:solidFill>
-              </a:rPr>
+              <a:rPr lang="en-US" sz="2000" dirty="0"/>
               <a:t>v0.10.9 and below</a:t>
             </a:r>
-            <a:endParaRPr lang="en-US" dirty="0">
-              <a:solidFill>
-                <a:schemeClr val="tx1"/>
-              </a:solidFill>
-            </a:endParaRPr>
           </a:p>
         </p:txBody>
       </p:sp>
@@ -8885,8 +8861,12 @@
           <a:p>
             <a:pPr lvl="1"/>
             <a:r>
+              <a:rPr lang="en-US" b="1" dirty="0"/>
+              <a:t>&gt;</a:t>
+            </a:r>
+            <a:r>
               <a:rPr lang="en-US" dirty="0"/>
-              <a:t>&gt;Tasks: Terminate Running Task</a:t>
+              <a:t>Tasks: Terminate Running Task</a:t>
             </a:r>
           </a:p>
           <a:p>
@@ -9023,9 +9003,59 @@
           <a:p>
             <a:pPr algn="ctr"/>
             <a:r>
+              <a:rPr lang="en-US" b="1" dirty="0"/>
+              <a:t>&gt;</a:t>
+            </a:r>
+            <a:r>
               <a:rPr lang="en-US" dirty="0"/>
-              <a:t>&gt;Tasks: Run Task</a:t>
-            </a:r>
+              <a:t>Tasks: Run Task</a:t>
+            </a:r>
+          </a:p>
+        </p:txBody>
+      </p:sp>
+      <p:sp>
+        <p:nvSpPr>
+          <p:cNvPr id="7" name="Rectangle 6"/>
+          <p:cNvSpPr/>
+          <p:nvPr/>
+        </p:nvSpPr>
+        <p:spPr>
+          <a:xfrm>
+            <a:off x="8206505" y="204072"/>
+            <a:ext cx="823196" cy="2054716"/>
+          </a:xfrm>
+          <a:prstGeom prst="rect">
+            <a:avLst/>
+          </a:prstGeom>
+          <a:noFill/>
+          <a:ln w="38100">
+            <a:solidFill>
+              <a:schemeClr val="bg1"/>
+            </a:solidFill>
+          </a:ln>
+        </p:spPr>
+        <p:style>
+          <a:lnRef idx="2">
+            <a:schemeClr val="accent1">
+              <a:shade val="50000"/>
+            </a:schemeClr>
+          </a:lnRef>
+          <a:fillRef idx="1">
+            <a:schemeClr val="accent1"/>
+          </a:fillRef>
+          <a:effectRef idx="0">
+            <a:schemeClr val="accent1"/>
+          </a:effectRef>
+          <a:fontRef idx="minor">
+            <a:schemeClr val="lt1"/>
+          </a:fontRef>
+        </p:style>
+        <p:txBody>
+          <a:bodyPr rtlCol="0" anchor="ctr"/>
+          <a:lstStyle/>
+          <a:p>
+            <a:pPr algn="ctr"/>
+            <a:endParaRPr lang="en-US"/>
           </a:p>
         </p:txBody>
       </p:sp>
@@ -9098,6 +9128,33 @@
                                   </p:childTnLst>
                                 </p:cTn>
                               </p:par>
+                              <p:par>
+                                <p:cTn id="7" presetID="1" presetClass="entr" presetSubtype="0" fill="hold" grpId="0" nodeType="withEffect">
+                                  <p:stCondLst>
+                                    <p:cond delay="0"/>
+                                  </p:stCondLst>
+                                  <p:childTnLst>
+                                    <p:set>
+                                      <p:cBhvr>
+                                        <p:cTn id="8" dur="1" fill="hold">
+                                          <p:stCondLst>
+                                            <p:cond delay="0"/>
+                                          </p:stCondLst>
+                                        </p:cTn>
+                                        <p:tgtEl>
+                                          <p:spTgt spid="7"/>
+                                        </p:tgtEl>
+                                        <p:attrNameLst>
+                                          <p:attrName>style.visibility</p:attrName>
+                                        </p:attrNameLst>
+                                      </p:cBhvr>
+                                      <p:to>
+                                        <p:strVal val="visible"/>
+                                      </p:to>
+                                    </p:set>
+                                  </p:childTnLst>
+                                </p:cTn>
+                              </p:par>
                             </p:childTnLst>
                           </p:cTn>
                         </p:par>
@@ -9127,6 +9184,7 @@
     </p:tnLst>
     <p:bldLst>
       <p:bldP spid="10" grpId="0" animBg="1"/>
+      <p:bldP spid="7" grpId="0" animBg="1"/>
     </p:bldLst>
   </p:timing>
 </p:sld>
@@ -9534,7 +9592,7 @@
           <a:p>
             <a:r>
               <a:rPr lang="en-US" dirty="0"/>
-              <a:t>Built-in Task Runner</a:t>
+              <a:t>Native Task Runner</a:t>
             </a:r>
           </a:p>
         </p:txBody>
@@ -9603,28 +9661,71 @@
           </a:p>
           <a:p>
             <a:r>
+              <a:rPr lang="en-US" b="1" dirty="0" err="1"/>
+              <a:t>isBuildCommand</a:t>
+            </a:r>
+            <a:r>
               <a:rPr lang="en-US" dirty="0"/>
-              <a:t>“isBuildCommand” property ties to Shift + Ctrl + B gesture</a:t>
-            </a:r>
-          </a:p>
-          <a:p>
+              <a:t> property ties to  </a:t>
+            </a:r>
+            <a:r>
+              <a:rPr lang="en-US" b="1" dirty="0"/>
+              <a:t>Shift</a:t>
+            </a:r>
             <a:r>
               <a:rPr lang="en-US" dirty="0"/>
-              <a:t>“</a:t>
-            </a:r>
-            <a:r>
-              <a:rPr lang="en-US" dirty="0" err="1"/>
+              <a:t> + </a:t>
+            </a:r>
+            <a:r>
+              <a:rPr lang="en-US" b="1" dirty="0"/>
+              <a:t>Ctrl</a:t>
+            </a:r>
+            <a:r>
+              <a:rPr lang="en-US" dirty="0"/>
+              <a:t> + </a:t>
+            </a:r>
+            <a:r>
+              <a:rPr lang="en-US" b="1" dirty="0"/>
+              <a:t>B</a:t>
+            </a:r>
+            <a:r>
+              <a:rPr lang="en-US" dirty="0"/>
+              <a:t>  gesture</a:t>
+            </a:r>
+          </a:p>
+          <a:p>
+            <a:r>
+              <a:rPr lang="en-US" b="1" dirty="0" err="1"/>
               <a:t>isTestCommand</a:t>
             </a:r>
             <a:r>
               <a:rPr lang="en-US" dirty="0"/>
-              <a:t>” property ties to Shift + Ctrl + </a:t>
-            </a:r>
-            <a:r>
-              <a:rPr lang="en-US"/>
-              <a:t>T gesture</a:t>
-            </a:r>
-            <a:endParaRPr lang="en-US" dirty="0"/>
+              <a:t> property ties to  </a:t>
+            </a:r>
+            <a:r>
+              <a:rPr lang="en-US" b="1" dirty="0"/>
+              <a:t>Shift</a:t>
+            </a:r>
+            <a:r>
+              <a:rPr lang="en-US" dirty="0"/>
+              <a:t> + </a:t>
+            </a:r>
+            <a:r>
+              <a:rPr lang="en-US" b="1" dirty="0"/>
+              <a:t>Ctrl</a:t>
+            </a:r>
+            <a:r>
+              <a:rPr lang="en-US" dirty="0"/>
+              <a:t> + </a:t>
+            </a:r>
+            <a:r>
+              <a:rPr lang="en-US" b="1" dirty="0"/>
+              <a:t>T</a:t>
+            </a:r>
+            <a:r>
+              <a:rPr lang="en-US" dirty="0"/>
+              <a:t>  gesture</a:t>
+            </a:r>
           </a:p>
           <a:p>
             <a:pPr lvl="1"/>
@@ -9652,6 +9753,88 @@
               <a:t>24</a:t>
             </a:fld>
             <a:endParaRPr lang="en-US" dirty="0"/>
+          </a:p>
+        </p:txBody>
+      </p:sp>
+      <p:sp>
+        <p:nvSpPr>
+          <p:cNvPr id="6" name="Rounded Rectangle 5"/>
+          <p:cNvSpPr/>
+          <p:nvPr/>
+        </p:nvSpPr>
+        <p:spPr>
+          <a:xfrm>
+            <a:off x="4632558" y="4862671"/>
+            <a:ext cx="1641071" cy="320948"/>
+          </a:xfrm>
+          <a:prstGeom prst="roundRect">
+            <a:avLst/>
+          </a:prstGeom>
+          <a:noFill/>
+        </p:spPr>
+        <p:style>
+          <a:lnRef idx="2">
+            <a:schemeClr val="accent1">
+              <a:shade val="50000"/>
+            </a:schemeClr>
+          </a:lnRef>
+          <a:fillRef idx="1">
+            <a:schemeClr val="accent1"/>
+          </a:fillRef>
+          <a:effectRef idx="0">
+            <a:schemeClr val="accent1"/>
+          </a:effectRef>
+          <a:fontRef idx="minor">
+            <a:schemeClr val="lt1"/>
+          </a:fontRef>
+        </p:style>
+        <p:txBody>
+          <a:bodyPr rtlCol="0" anchor="ctr"/>
+          <a:lstStyle/>
+          <a:p>
+            <a:pPr algn="ctr"/>
+            <a:endParaRPr lang="en-US"/>
+          </a:p>
+        </p:txBody>
+      </p:sp>
+      <p:sp>
+        <p:nvSpPr>
+          <p:cNvPr id="8" name="Rounded Rectangle 7"/>
+          <p:cNvSpPr/>
+          <p:nvPr/>
+        </p:nvSpPr>
+        <p:spPr>
+          <a:xfrm>
+            <a:off x="4530619" y="5269412"/>
+            <a:ext cx="1641071" cy="320948"/>
+          </a:xfrm>
+          <a:prstGeom prst="roundRect">
+            <a:avLst/>
+          </a:prstGeom>
+          <a:noFill/>
+        </p:spPr>
+        <p:style>
+          <a:lnRef idx="2">
+            <a:schemeClr val="accent1">
+              <a:shade val="50000"/>
+            </a:schemeClr>
+          </a:lnRef>
+          <a:fillRef idx="1">
+            <a:schemeClr val="accent1"/>
+          </a:fillRef>
+          <a:effectRef idx="0">
+            <a:schemeClr val="accent1"/>
+          </a:effectRef>
+          <a:fontRef idx="minor">
+            <a:schemeClr val="lt1"/>
+          </a:fontRef>
+        </p:style>
+        <p:txBody>
+          <a:bodyPr rtlCol="0" anchor="ctr"/>
+          <a:lstStyle/>
+          <a:p>
+            <a:pPr algn="ctr"/>
+            <a:endParaRPr lang="en-US"/>
           </a:p>
         </p:txBody>
       </p:sp>
@@ -10700,7 +10883,7 @@
           <a:p>
             <a:r>
               <a:rPr lang="en-US" dirty="0"/>
-              <a:t>About VS Code</a:t>
+              <a:t>About VS Code (cont.)</a:t>
             </a:r>
           </a:p>
         </p:txBody>
@@ -10769,7 +10952,7 @@
           <a:p>
             <a:r>
               <a:rPr lang="en-US" dirty="0"/>
-              <a:t>Built with the 3 pillars of the web</a:t>
+              <a:t>Built w/ web technologies</a:t>
             </a:r>
           </a:p>
         </p:txBody>
@@ -10799,32 +10982,43 @@
       </p:sp>
       <p:pic>
         <p:nvPicPr>
-          <p:cNvPr id="9" name="Picture 8"/>
+          <p:cNvPr id="1026" name="Picture 2" descr="http://www.typescriptlang.org/content/images/logo_small.png"/>
           <p:cNvPicPr>
-            <a:picLocks noChangeAspect="1"/>
+            <a:picLocks noChangeAspect="1" noChangeArrowheads="1"/>
           </p:cNvPicPr>
           <p:nvPr/>
         </p:nvPicPr>
         <p:blipFill>
-          <a:blip r:embed="rId3" cstate="print">
+          <a:blip r:embed="rId3">
             <a:extLst>
               <a:ext uri="{28A0092B-C50C-407E-A947-70E740481C1C}">
                 <a14:useLocalDpi xmlns:a14="http://schemas.microsoft.com/office/drawing/2010/main" val="0"/>
               </a:ext>
             </a:extLst>
           </a:blip>
+          <a:srcRect/>
           <a:stretch>
             <a:fillRect/>
           </a:stretch>
         </p:blipFill>
-        <p:spPr>
+        <p:spPr bwMode="auto">
           <a:xfrm>
-            <a:off x="5196840" y="4371868"/>
-            <a:ext cx="1675920" cy="1783159"/>
+            <a:off x="1257699" y="4884757"/>
+            <a:ext cx="2381250" cy="581026"/>
           </a:xfrm>
           <a:prstGeom prst="rect">
             <a:avLst/>
           </a:prstGeom>
+          <a:noFill/>
+          <a:extLst>
+            <a:ext uri="{909E8E84-426E-40DD-AFC4-6F175D3DCCD1}">
+              <a14:hiddenFill xmlns:a14="http://schemas.microsoft.com/office/drawing/2010/main">
+                <a:solidFill>
+                  <a:srgbClr val="FFFFFF"/>
+                </a:solidFill>
+              </a14:hiddenFill>
+            </a:ext>
+          </a:extLst>
         </p:spPr>
       </p:pic>
     </p:spTree>
@@ -13154,6 +13348,13 @@
               <a:rPr lang="en-US" dirty="0"/>
               <a:t>Extensibility</a:t>
             </a:r>
+            <a:br>
+              <a:rPr lang="en-US" dirty="0"/>
+            </a:br>
+            <a:r>
+              <a:rPr lang="en-US" sz="2000" dirty="0"/>
+              <a:t>v0.10.1 and above</a:t>
+            </a:r>
           </a:p>
         </p:txBody>
       </p:sp>
@@ -13171,12 +13372,6 @@
         <p:txBody>
           <a:bodyPr/>
           <a:lstStyle/>
-          <a:p>
-            <a:r>
-              <a:rPr lang="en-US" dirty="0"/>
-              <a:t>Introduced in v0.10.1</a:t>
-            </a:r>
-          </a:p>
           <a:p>
             <a:r>
               <a:rPr lang="en-US" dirty="0">
@@ -13239,7 +13434,7 @@
         </p:blipFill>
         <p:spPr>
           <a:xfrm>
-            <a:off x="1" y="2962045"/>
+            <a:off x="1" y="2571520"/>
             <a:ext cx="12192000" cy="4907290"/>
           </a:xfrm>
           <a:prstGeom prst="rect">

</xml_diff>

<commit_message>
Update MKE JS slides
</commit_message>
<xml_diff>
--- a/Intro to JavaScript Tooling in VS Code - MKEJS.pptx
+++ b/Intro to JavaScript Tooling in VS Code - MKEJS.pptx
@@ -238,7 +238,7 @@
           <a:p>
             <a:fld id="{669E24BE-8A14-406C-93AE-FEDF4702362B}" type="datetimeFigureOut">
               <a:rPr lang="en-US" smtClean="0"/>
-              <a:t>3/19/2016</a:t>
+              <a:t>3/20/2016</a:t>
             </a:fld>
             <a:endParaRPr lang="en-US" dirty="0"/>
           </a:p>
@@ -1311,7 +1311,7 @@
           <a:p>
             <a:fld id="{8008D7A7-D1E9-49FE-B288-75D755D02F1B}" type="datetime1">
               <a:rPr lang="en-US" smtClean="0"/>
-              <a:t>3/19/2016</a:t>
+              <a:t>3/20/2016</a:t>
             </a:fld>
             <a:endParaRPr lang="en-US" dirty="0"/>
           </a:p>
@@ -1574,7 +1574,7 @@
           <a:p>
             <a:fld id="{565130A9-CCEE-4E49-AF50-9A9178C093F5}" type="datetime1">
               <a:rPr lang="en-US" smtClean="0"/>
-              <a:t>3/19/2016</a:t>
+              <a:t>3/20/2016</a:t>
             </a:fld>
             <a:endParaRPr lang="en-US" dirty="0"/>
           </a:p>
@@ -1900,7 +1900,7 @@
           <a:p>
             <a:fld id="{5FFEE7F5-B2E5-489A-976D-734D7F853DE3}" type="datetime1">
               <a:rPr lang="en-US" smtClean="0"/>
-              <a:t>3/19/2016</a:t>
+              <a:t>3/20/2016</a:t>
             </a:fld>
             <a:endParaRPr lang="en-US" dirty="0"/>
           </a:p>
@@ -2253,7 +2253,7 @@
           <a:p>
             <a:fld id="{1DDC5727-5F18-4B62-81B5-C092F8CCA971}" type="datetime1">
               <a:rPr lang="en-US" smtClean="0"/>
-              <a:t>3/19/2016</a:t>
+              <a:t>3/20/2016</a:t>
             </a:fld>
             <a:endParaRPr lang="en-US" dirty="0"/>
           </a:p>
@@ -2579,7 +2579,7 @@
           <a:p>
             <a:fld id="{DD7596D5-BBCA-4EE5-AC34-2F838BA68892}" type="datetime1">
               <a:rPr lang="en-US" smtClean="0"/>
-              <a:t>3/19/2016</a:t>
+              <a:t>3/20/2016</a:t>
             </a:fld>
             <a:endParaRPr lang="en-US" dirty="0"/>
           </a:p>
@@ -2984,7 +2984,7 @@
           <a:p>
             <a:fld id="{C87E594A-105F-4330-BE78-40BFD5E05FF3}" type="datetime1">
               <a:rPr lang="en-US" smtClean="0"/>
-              <a:t>3/19/2016</a:t>
+              <a:t>3/20/2016</a:t>
             </a:fld>
             <a:endParaRPr lang="en-US" dirty="0"/>
           </a:p>
@@ -3166,7 +3166,7 @@
           <a:p>
             <a:fld id="{50DAB467-0635-440B-9BC4-DA322DD73B70}" type="datetime1">
               <a:rPr lang="en-US" smtClean="0"/>
-              <a:t>3/19/2016</a:t>
+              <a:t>3/20/2016</a:t>
             </a:fld>
             <a:endParaRPr lang="en-US" dirty="0"/>
           </a:p>
@@ -3358,7 +3358,7 @@
           <a:p>
             <a:fld id="{5E48D92D-E3A5-4B10-B1FC-D041F161170C}" type="datetime1">
               <a:rPr lang="en-US" smtClean="0"/>
-              <a:t>3/19/2016</a:t>
+              <a:t>3/20/2016</a:t>
             </a:fld>
             <a:endParaRPr lang="en-US" dirty="0"/>
           </a:p>
@@ -3546,7 +3546,7 @@
           <a:p>
             <a:fld id="{834C18EA-D952-4AE1-A6E7-E6731635F9D2}" type="datetime1">
               <a:rPr lang="en-US" smtClean="0"/>
-              <a:t>3/19/2016</a:t>
+              <a:t>3/20/2016</a:t>
             </a:fld>
             <a:endParaRPr lang="en-US" dirty="0"/>
           </a:p>
@@ -3805,7 +3805,7 @@
           <a:p>
             <a:fld id="{13032A52-9E14-487A-A3FB-E00D36231CE7}" type="datetime1">
               <a:rPr lang="en-US" smtClean="0"/>
-              <a:t>3/19/2016</a:t>
+              <a:t>3/20/2016</a:t>
             </a:fld>
             <a:endParaRPr lang="en-US" dirty="0"/>
           </a:p>
@@ -4049,7 +4049,7 @@
           <a:p>
             <a:fld id="{8C5CA72F-91C6-447B-8CFD-10CC50FBFEAC}" type="datetime1">
               <a:rPr lang="en-US" smtClean="0"/>
-              <a:t>3/19/2016</a:t>
+              <a:t>3/20/2016</a:t>
             </a:fld>
             <a:endParaRPr lang="en-US" dirty="0"/>
           </a:p>
@@ -4435,7 +4435,7 @@
           <a:p>
             <a:fld id="{2CCBA931-94B6-4C88-A7AC-0B43FAFFEEC1}" type="datetime1">
               <a:rPr lang="en-US" smtClean="0"/>
-              <a:t>3/19/2016</a:t>
+              <a:t>3/20/2016</a:t>
             </a:fld>
             <a:endParaRPr lang="en-US" dirty="0"/>
           </a:p>
@@ -4570,7 +4570,7 @@
           <a:p>
             <a:fld id="{A17CC6B2-4719-4EFD-BB2D-A2C62F0625B7}" type="datetime1">
               <a:rPr lang="en-US" smtClean="0"/>
-              <a:t>3/19/2016</a:t>
+              <a:t>3/20/2016</a:t>
             </a:fld>
             <a:endParaRPr lang="en-US" dirty="0"/>
           </a:p>
@@ -4677,7 +4677,7 @@
           <a:p>
             <a:fld id="{9AC4E54B-2176-4BC1-BC54-F80551EDB034}" type="datetime1">
               <a:rPr lang="en-US" smtClean="0"/>
-              <a:t>3/19/2016</a:t>
+              <a:t>3/20/2016</a:t>
             </a:fld>
             <a:endParaRPr lang="en-US" dirty="0"/>
           </a:p>
@@ -4944,7 +4944,7 @@
           <a:p>
             <a:fld id="{F73BBE7C-717C-4AB2-A881-24835FA94B24}" type="datetime1">
               <a:rPr lang="en-US" smtClean="0"/>
-              <a:t>3/19/2016</a:t>
+              <a:t>3/20/2016</a:t>
             </a:fld>
             <a:endParaRPr lang="en-US" dirty="0"/>
           </a:p>
@@ -5218,7 +5218,7 @@
           <a:p>
             <a:fld id="{BD6C4C3D-17A3-49F5-8381-0500C8735BF2}" type="datetime1">
               <a:rPr lang="en-US" smtClean="0"/>
-              <a:t>3/19/2016</a:t>
+              <a:t>3/20/2016</a:t>
             </a:fld>
             <a:endParaRPr lang="en-US" dirty="0"/>
           </a:p>
@@ -5973,7 +5973,7 @@
           <a:p>
             <a:fld id="{1D480221-EA8F-4F92-87B7-59E96BBC3974}" type="datetime1">
               <a:rPr lang="en-US" smtClean="0"/>
-              <a:t>3/19/2016</a:t>
+              <a:t>3/20/2016</a:t>
             </a:fld>
             <a:endParaRPr lang="en-US" dirty="0"/>
           </a:p>
@@ -6657,8 +6657,8 @@
           </a:p>
         </p:txBody>
       </p:sp>
-      <mc:AlternateContent xmlns:mc="http://schemas.openxmlformats.org/markup-compatibility/2006">
-        <mc:Choice xmlns:we="http://schemas.microsoft.com/office/webextensions/webextension/2010/11" xmlns:pca="http://schemas.microsoft.com/office/powerpoint/2013/contentapp" Requires="we pca">
+      <mc:AlternateContent xmlns:mc="http://schemas.openxmlformats.org/markup-compatibility/2006" xmlns:we="http://schemas.microsoft.com/office/webextensions/webextension/2010/11" xmlns:pca="http://schemas.microsoft.com/office/powerpoint/2013/contentapp">
+        <mc:Choice Requires="we pca">
           <p:graphicFrame>
             <p:nvGraphicFramePr>
               <p:cNvPr id="5" name="Content Placeholder 4" title="Code Presenter Pro"/>
@@ -6685,7 +6685,7 @@
             </a:graphic>
           </p:graphicFrame>
         </mc:Choice>
-        <mc:Fallback>
+        <mc:Fallback xmlns="">
           <p:pic>
             <p:nvPicPr>
               <p:cNvPr id="5" name="Content Placeholder 4" title="Code Presenter Pro"/>
@@ -6799,8 +6799,8 @@
           </a:p>
         </p:txBody>
       </p:sp>
-      <mc:AlternateContent xmlns:mc="http://schemas.openxmlformats.org/markup-compatibility/2006">
-        <mc:Choice xmlns:we="http://schemas.microsoft.com/office/webextensions/webextension/2010/11" xmlns:pca="http://schemas.microsoft.com/office/powerpoint/2013/contentapp" Requires="we pca">
+      <mc:AlternateContent xmlns:mc="http://schemas.openxmlformats.org/markup-compatibility/2006" xmlns:we="http://schemas.microsoft.com/office/webextensions/webextension/2010/11" xmlns:pca="http://schemas.microsoft.com/office/powerpoint/2013/contentapp">
+        <mc:Choice Requires="we pca">
           <p:graphicFrame>
             <p:nvGraphicFramePr>
               <p:cNvPr id="5" name="Content Placeholder 4" title="Code Presenter Pro"/>
@@ -6827,7 +6827,7 @@
             </a:graphic>
           </p:graphicFrame>
         </mc:Choice>
-        <mc:Fallback>
+        <mc:Fallback xmlns="">
           <p:pic>
             <p:nvPicPr>
               <p:cNvPr id="5" name="Content Placeholder 4" title="Code Presenter Pro"/>
@@ -6941,8 +6941,8 @@
           </a:p>
         </p:txBody>
       </p:sp>
-      <mc:AlternateContent xmlns:mc="http://schemas.openxmlformats.org/markup-compatibility/2006">
-        <mc:Choice xmlns:we="http://schemas.microsoft.com/office/webextensions/webextension/2010/11" xmlns:pca="http://schemas.microsoft.com/office/powerpoint/2013/contentapp" Requires="we pca">
+      <mc:AlternateContent xmlns:mc="http://schemas.openxmlformats.org/markup-compatibility/2006" xmlns:we="http://schemas.microsoft.com/office/webextensions/webextension/2010/11" xmlns:pca="http://schemas.microsoft.com/office/powerpoint/2013/contentapp">
+        <mc:Choice Requires="we pca">
           <p:graphicFrame>
             <p:nvGraphicFramePr>
               <p:cNvPr id="5" name="Content Placeholder 4" title="Code Presenter Pro"/>
@@ -6969,7 +6969,7 @@
             </a:graphic>
           </p:graphicFrame>
         </mc:Choice>
-        <mc:Fallback>
+        <mc:Fallback xmlns="">
           <p:pic>
             <p:nvPicPr>
               <p:cNvPr id="5" name="Content Placeholder 4" title="Code Presenter Pro"/>
@@ -8592,7 +8592,23 @@
           <a:p>
             <a:r>
               <a:rPr lang="en-US" dirty="0"/>
-              <a:t>Enabling CommonJS Support</a:t>
+              <a:t>Enabling </a:t>
+            </a:r>
+            <a:r>
+              <a:rPr lang="en-US" dirty="0" err="1"/>
+              <a:t>CommonJS</a:t>
+            </a:r>
+            <a:r>
+              <a:rPr lang="en-US" dirty="0"/>
+              <a:t> &amp; </a:t>
+            </a:r>
+            <a:r>
+              <a:rPr lang="en-US" dirty="0" err="1"/>
+              <a:t>Webpack</a:t>
+            </a:r>
+            <a:r>
+              <a:rPr lang="en-US" dirty="0"/>
+              <a:t> Support</a:t>
             </a:r>
           </a:p>
         </p:txBody>
@@ -8682,28 +8698,22 @@
       </p:pic>
       <p:pic>
         <p:nvPicPr>
-          <p:cNvPr id="3" name="Picture 2"/>
+          <p:cNvPr id="7" name="Picture 6"/>
           <p:cNvPicPr>
             <a:picLocks noChangeAspect="1"/>
           </p:cNvPicPr>
           <p:nvPr/>
         </p:nvPicPr>
         <p:blipFill>
-          <a:blip r:embed="rId4">
-            <a:extLst>
-              <a:ext uri="{28A0092B-C50C-407E-A947-70E740481C1C}">
-                <a14:useLocalDpi xmlns:a14="http://schemas.microsoft.com/office/drawing/2010/main" val="0"/>
-              </a:ext>
-            </a:extLst>
-          </a:blip>
+          <a:blip r:embed="rId4"/>
           <a:stretch>
             <a:fillRect/>
           </a:stretch>
         </p:blipFill>
         <p:spPr>
           <a:xfrm>
-            <a:off x="6121062" y="2352087"/>
-            <a:ext cx="2924189" cy="1572441"/>
+            <a:off x="5938576" y="2766373"/>
+            <a:ext cx="3256202" cy="1021485"/>
           </a:xfrm>
           <a:prstGeom prst="rect">
             <a:avLst/>
@@ -9415,7 +9425,15 @@
           <a:p>
             <a:r>
               <a:rPr lang="en-US" dirty="0"/>
-              <a:t>Discovering &amp; Debugging Gulp Tasks</a:t>
+              <a:t>Discovering</a:t>
+            </a:r>
+            <a:r>
+              <a:rPr lang="en-US"/>
+              <a:t>, Launching, </a:t>
+            </a:r>
+            <a:r>
+              <a:rPr lang="en-US" dirty="0"/>
+              <a:t>&amp; Debugging Gulp Tasks</a:t>
             </a:r>
           </a:p>
         </p:txBody>
@@ -10500,8 +10518,13 @@
             </a:pPr>
             <a:r>
               <a:rPr lang="en-US" dirty="0"/>
-              <a:t>Launch Node.js program like this: </a:t>
-            </a:r>
+              <a:t>Launch </a:t>
+            </a:r>
+            <a:r>
+              <a:rPr lang="en-US"/>
+              <a:t>Node.js program: </a:t>
+            </a:r>
+            <a:endParaRPr lang="en-US" dirty="0"/>
           </a:p>
           <a:p>
             <a:pPr lvl="2"/>

</xml_diff>

<commit_message>
Minor tweaks to MKE JS deck
</commit_message>
<xml_diff>
--- a/Intro to JavaScript Tooling in VS Code - MKEJS.pptx
+++ b/Intro to JavaScript Tooling in VS Code - MKEJS.pptx
@@ -238,7 +238,7 @@
           <a:p>
             <a:fld id="{669E24BE-8A14-406C-93AE-FEDF4702362B}" type="datetimeFigureOut">
               <a:rPr lang="en-US" smtClean="0"/>
-              <a:t>3/20/2016</a:t>
+              <a:t>3/21/2016</a:t>
             </a:fld>
             <a:endParaRPr lang="en-US" dirty="0"/>
           </a:p>
@@ -1311,7 +1311,7 @@
           <a:p>
             <a:fld id="{8008D7A7-D1E9-49FE-B288-75D755D02F1B}" type="datetime1">
               <a:rPr lang="en-US" smtClean="0"/>
-              <a:t>3/20/2016</a:t>
+              <a:t>3/21/2016</a:t>
             </a:fld>
             <a:endParaRPr lang="en-US" dirty="0"/>
           </a:p>
@@ -1574,7 +1574,7 @@
           <a:p>
             <a:fld id="{565130A9-CCEE-4E49-AF50-9A9178C093F5}" type="datetime1">
               <a:rPr lang="en-US" smtClean="0"/>
-              <a:t>3/20/2016</a:t>
+              <a:t>3/21/2016</a:t>
             </a:fld>
             <a:endParaRPr lang="en-US" dirty="0"/>
           </a:p>
@@ -1900,7 +1900,7 @@
           <a:p>
             <a:fld id="{5FFEE7F5-B2E5-489A-976D-734D7F853DE3}" type="datetime1">
               <a:rPr lang="en-US" smtClean="0"/>
-              <a:t>3/20/2016</a:t>
+              <a:t>3/21/2016</a:t>
             </a:fld>
             <a:endParaRPr lang="en-US" dirty="0"/>
           </a:p>
@@ -2253,7 +2253,7 @@
           <a:p>
             <a:fld id="{1DDC5727-5F18-4B62-81B5-C092F8CCA971}" type="datetime1">
               <a:rPr lang="en-US" smtClean="0"/>
-              <a:t>3/20/2016</a:t>
+              <a:t>3/21/2016</a:t>
             </a:fld>
             <a:endParaRPr lang="en-US" dirty="0"/>
           </a:p>
@@ -2579,7 +2579,7 @@
           <a:p>
             <a:fld id="{DD7596D5-BBCA-4EE5-AC34-2F838BA68892}" type="datetime1">
               <a:rPr lang="en-US" smtClean="0"/>
-              <a:t>3/20/2016</a:t>
+              <a:t>3/21/2016</a:t>
             </a:fld>
             <a:endParaRPr lang="en-US" dirty="0"/>
           </a:p>
@@ -2984,7 +2984,7 @@
           <a:p>
             <a:fld id="{C87E594A-105F-4330-BE78-40BFD5E05FF3}" type="datetime1">
               <a:rPr lang="en-US" smtClean="0"/>
-              <a:t>3/20/2016</a:t>
+              <a:t>3/21/2016</a:t>
             </a:fld>
             <a:endParaRPr lang="en-US" dirty="0"/>
           </a:p>
@@ -3166,7 +3166,7 @@
           <a:p>
             <a:fld id="{50DAB467-0635-440B-9BC4-DA322DD73B70}" type="datetime1">
               <a:rPr lang="en-US" smtClean="0"/>
-              <a:t>3/20/2016</a:t>
+              <a:t>3/21/2016</a:t>
             </a:fld>
             <a:endParaRPr lang="en-US" dirty="0"/>
           </a:p>
@@ -3358,7 +3358,7 @@
           <a:p>
             <a:fld id="{5E48D92D-E3A5-4B10-B1FC-D041F161170C}" type="datetime1">
               <a:rPr lang="en-US" smtClean="0"/>
-              <a:t>3/20/2016</a:t>
+              <a:t>3/21/2016</a:t>
             </a:fld>
             <a:endParaRPr lang="en-US" dirty="0"/>
           </a:p>
@@ -3546,7 +3546,7 @@
           <a:p>
             <a:fld id="{834C18EA-D952-4AE1-A6E7-E6731635F9D2}" type="datetime1">
               <a:rPr lang="en-US" smtClean="0"/>
-              <a:t>3/20/2016</a:t>
+              <a:t>3/21/2016</a:t>
             </a:fld>
             <a:endParaRPr lang="en-US" dirty="0"/>
           </a:p>
@@ -3805,7 +3805,7 @@
           <a:p>
             <a:fld id="{13032A52-9E14-487A-A3FB-E00D36231CE7}" type="datetime1">
               <a:rPr lang="en-US" smtClean="0"/>
-              <a:t>3/20/2016</a:t>
+              <a:t>3/21/2016</a:t>
             </a:fld>
             <a:endParaRPr lang="en-US" dirty="0"/>
           </a:p>
@@ -4049,7 +4049,7 @@
           <a:p>
             <a:fld id="{8C5CA72F-91C6-447B-8CFD-10CC50FBFEAC}" type="datetime1">
               <a:rPr lang="en-US" smtClean="0"/>
-              <a:t>3/20/2016</a:t>
+              <a:t>3/21/2016</a:t>
             </a:fld>
             <a:endParaRPr lang="en-US" dirty="0"/>
           </a:p>
@@ -4435,7 +4435,7 @@
           <a:p>
             <a:fld id="{2CCBA931-94B6-4C88-A7AC-0B43FAFFEEC1}" type="datetime1">
               <a:rPr lang="en-US" smtClean="0"/>
-              <a:t>3/20/2016</a:t>
+              <a:t>3/21/2016</a:t>
             </a:fld>
             <a:endParaRPr lang="en-US" dirty="0"/>
           </a:p>
@@ -4570,7 +4570,7 @@
           <a:p>
             <a:fld id="{A17CC6B2-4719-4EFD-BB2D-A2C62F0625B7}" type="datetime1">
               <a:rPr lang="en-US" smtClean="0"/>
-              <a:t>3/20/2016</a:t>
+              <a:t>3/21/2016</a:t>
             </a:fld>
             <a:endParaRPr lang="en-US" dirty="0"/>
           </a:p>
@@ -4677,7 +4677,7 @@
           <a:p>
             <a:fld id="{9AC4E54B-2176-4BC1-BC54-F80551EDB034}" type="datetime1">
               <a:rPr lang="en-US" smtClean="0"/>
-              <a:t>3/20/2016</a:t>
+              <a:t>3/21/2016</a:t>
             </a:fld>
             <a:endParaRPr lang="en-US" dirty="0"/>
           </a:p>
@@ -4944,7 +4944,7 @@
           <a:p>
             <a:fld id="{F73BBE7C-717C-4AB2-A881-24835FA94B24}" type="datetime1">
               <a:rPr lang="en-US" smtClean="0"/>
-              <a:t>3/20/2016</a:t>
+              <a:t>3/21/2016</a:t>
             </a:fld>
             <a:endParaRPr lang="en-US" dirty="0"/>
           </a:p>
@@ -5218,7 +5218,7 @@
           <a:p>
             <a:fld id="{BD6C4C3D-17A3-49F5-8381-0500C8735BF2}" type="datetime1">
               <a:rPr lang="en-US" smtClean="0"/>
-              <a:t>3/20/2016</a:t>
+              <a:t>3/21/2016</a:t>
             </a:fld>
             <a:endParaRPr lang="en-US" dirty="0"/>
           </a:p>
@@ -5973,7 +5973,7 @@
           <a:p>
             <a:fld id="{1D480221-EA8F-4F92-87B7-59E96BBC3974}" type="datetime1">
               <a:rPr lang="en-US" smtClean="0"/>
-              <a:t>3/20/2016</a:t>
+              <a:t>3/21/2016</a:t>
             </a:fld>
             <a:endParaRPr lang="en-US" dirty="0"/>
           </a:p>
@@ -9425,15 +9425,7 @@
           <a:p>
             <a:r>
               <a:rPr lang="en-US" dirty="0"/>
-              <a:t>Discovering</a:t>
-            </a:r>
-            <a:r>
-              <a:rPr lang="en-US"/>
-              <a:t>, Launching, </a:t>
-            </a:r>
-            <a:r>
-              <a:rPr lang="en-US" dirty="0"/>
-              <a:t>&amp; Debugging Gulp Tasks</a:t>
+              <a:t>Discovering, Launching, &amp; Debugging Gulp Tasks</a:t>
             </a:r>
           </a:p>
         </p:txBody>
@@ -9927,8 +9919,8 @@
           </a:p>
         </p:txBody>
       </p:sp>
-      <mc:AlternateContent xmlns:mc="http://schemas.openxmlformats.org/markup-compatibility/2006" xmlns:we="http://schemas.microsoft.com/office/webextensions/webextension/2010/11" xmlns:pca="http://schemas.microsoft.com/office/powerpoint/2013/contentapp">
-        <mc:Choice Requires="we pca">
+      <mc:AlternateContent xmlns:mc="http://schemas.openxmlformats.org/markup-compatibility/2006">
+        <mc:Choice xmlns:we="http://schemas.microsoft.com/office/webextensions/webextension/2010/11" xmlns:pca="http://schemas.microsoft.com/office/powerpoint/2013/contentapp" Requires="we pca">
           <p:graphicFrame>
             <p:nvGraphicFramePr>
               <p:cNvPr id="5" name="Content Placeholder 4" title="Code Presenter Pro"/>
@@ -9955,7 +9947,7 @@
             </a:graphic>
           </p:graphicFrame>
         </mc:Choice>
-        <mc:Fallback xmlns="">
+        <mc:Fallback>
           <p:pic>
             <p:nvPicPr>
               <p:cNvPr id="5" name="Content Placeholder 4" title="Code Presenter Pro"/>
@@ -10363,8 +10355,8 @@
           </a:p>
         </p:txBody>
       </p:sp>
-      <mc:AlternateContent xmlns:mc="http://schemas.openxmlformats.org/markup-compatibility/2006" xmlns:we="http://schemas.microsoft.com/office/webextensions/webextension/2010/11" xmlns:pca="http://schemas.microsoft.com/office/powerpoint/2013/contentapp">
-        <mc:Choice Requires="we pca">
+      <mc:AlternateContent xmlns:mc="http://schemas.openxmlformats.org/markup-compatibility/2006">
+        <mc:Choice xmlns:we="http://schemas.microsoft.com/office/webextensions/webextension/2010/11" xmlns:pca="http://schemas.microsoft.com/office/powerpoint/2013/contentapp" Requires="we pca">
           <p:graphicFrame>
             <p:nvGraphicFramePr>
               <p:cNvPr id="2" name="Add-in 1" title="Code Presenter Pro"/>
@@ -10390,7 +10382,7 @@
             </a:graphic>
           </p:graphicFrame>
         </mc:Choice>
-        <mc:Fallback xmlns="">
+        <mc:Fallback>
           <p:pic>
             <p:nvPicPr>
               <p:cNvPr id="2" name="Add-in 1" title="Code Presenter Pro"/>
@@ -10729,7 +10721,7 @@
           <a:p>
             <a:r>
               <a:rPr lang="en-US" dirty="0"/>
-              <a:t>Debugging Mocha Unit Tests</a:t>
+              <a:t>Debugging Mocha Unit Tests: Attach to Node Process</a:t>
             </a:r>
           </a:p>
         </p:txBody>
@@ -14051,8 +14043,8 @@
           </a:p>
         </p:txBody>
       </p:sp>
-      <mc:AlternateContent xmlns:mc="http://schemas.openxmlformats.org/markup-compatibility/2006">
-        <mc:Choice xmlns:we="http://schemas.microsoft.com/office/webextensions/webextension/2010/11" xmlns:pca="http://schemas.microsoft.com/office/powerpoint/2013/contentapp" Requires="we pca">
+      <mc:AlternateContent xmlns:mc="http://schemas.openxmlformats.org/markup-compatibility/2006" xmlns:we="http://schemas.microsoft.com/office/webextensions/webextension/2010/11" xmlns:pca="http://schemas.microsoft.com/office/powerpoint/2013/contentapp">
+        <mc:Choice Requires="we pca">
           <p:graphicFrame>
             <p:nvGraphicFramePr>
               <p:cNvPr id="5" name="Content Placeholder 4" title="Code Presenter Pro"/>
@@ -14079,7 +14071,7 @@
             </a:graphic>
           </p:graphicFrame>
         </mc:Choice>
-        <mc:Fallback>
+        <mc:Fallback xmlns="">
           <p:pic>
             <p:nvPicPr>
               <p:cNvPr id="5" name="Content Placeholder 4" title="Code Presenter Pro"/>

</xml_diff>